<commit_message>
Changes to be committed: 	modified:   borderland/1-cadusd/Presentation/CADUSD.pptx 	modified:   borderland/2-urea/presentation/urea.pptx 	new file:   borderland/2-urea/summary/Mahdi - Urea Analysis Summary.docx
</commit_message>
<xml_diff>
--- a/borderland/1-cadusd/Presentation/CADUSD.pptx
+++ b/borderland/1-cadusd/Presentation/CADUSD.pptx
@@ -5,7 +5,7 @@
     <p:sldMasterId id="2147483732" r:id="rId1"/>
   </p:sldMasterIdLst>
   <p:notesMasterIdLst>
-    <p:notesMasterId r:id="rId31"/>
+    <p:notesMasterId r:id="rId33"/>
   </p:notesMasterIdLst>
   <p:sldIdLst>
     <p:sldId id="256" r:id="rId2"/>
@@ -23,20 +23,22 @@
     <p:sldId id="280" r:id="rId14"/>
     <p:sldId id="279" r:id="rId15"/>
     <p:sldId id="273" r:id="rId16"/>
-    <p:sldId id="274" r:id="rId17"/>
-    <p:sldId id="275" r:id="rId18"/>
-    <p:sldId id="277" r:id="rId19"/>
-    <p:sldId id="276" r:id="rId20"/>
-    <p:sldId id="287" r:id="rId21"/>
-    <p:sldId id="278" r:id="rId22"/>
-    <p:sldId id="286" r:id="rId23"/>
-    <p:sldId id="269" r:id="rId24"/>
-    <p:sldId id="285" r:id="rId25"/>
-    <p:sldId id="270" r:id="rId26"/>
-    <p:sldId id="281" r:id="rId27"/>
-    <p:sldId id="282" r:id="rId28"/>
-    <p:sldId id="271" r:id="rId29"/>
-    <p:sldId id="272" r:id="rId30"/>
+    <p:sldId id="288" r:id="rId17"/>
+    <p:sldId id="274" r:id="rId18"/>
+    <p:sldId id="275" r:id="rId19"/>
+    <p:sldId id="277" r:id="rId20"/>
+    <p:sldId id="276" r:id="rId21"/>
+    <p:sldId id="289" r:id="rId22"/>
+    <p:sldId id="287" r:id="rId23"/>
+    <p:sldId id="278" r:id="rId24"/>
+    <p:sldId id="286" r:id="rId25"/>
+    <p:sldId id="269" r:id="rId26"/>
+    <p:sldId id="285" r:id="rId27"/>
+    <p:sldId id="270" r:id="rId28"/>
+    <p:sldId id="281" r:id="rId29"/>
+    <p:sldId id="282" r:id="rId30"/>
+    <p:sldId id="271" r:id="rId31"/>
+    <p:sldId id="272" r:id="rId32"/>
   </p:sldIdLst>
   <p:sldSz cx="12192000" cy="6858000"/>
   <p:notesSz cx="6858000" cy="9144000"/>
@@ -225,7 +227,7 @@
           <a:p>
             <a:fld id="{A0D978CE-A6C1-477F-AF83-A7D9EEED15D0}" type="datetimeFigureOut">
               <a:rPr lang="en-US" smtClean="0"/>
-              <a:t>2025-09-29</a:t>
+              <a:t>10/1/2025</a:t>
             </a:fld>
             <a:endParaRPr lang="en-US"/>
           </a:p>
@@ -944,7 +946,7 @@
           <a:p>
             <a:fld id="{3A99376B-ADBF-4BED-A802-ABAD07EED65B}" type="slidenum">
               <a:rPr lang="en-US" smtClean="0"/>
-              <a:t>16</a:t>
+              <a:t>17</a:t>
             </a:fld>
             <a:endParaRPr lang="en-US"/>
           </a:p>
@@ -1038,7 +1040,7 @@
           <a:p>
             <a:fld id="{3A99376B-ADBF-4BED-A802-ABAD07EED65B}" type="slidenum">
               <a:rPr lang="en-US" smtClean="0"/>
-              <a:t>17</a:t>
+              <a:t>18</a:t>
             </a:fld>
             <a:endParaRPr lang="en-US"/>
           </a:p>
@@ -1137,7 +1139,7 @@
           <a:p>
             <a:fld id="{3A99376B-ADBF-4BED-A802-ABAD07EED65B}" type="slidenum">
               <a:rPr lang="en-US" smtClean="0"/>
-              <a:t>25</a:t>
+              <a:t>27</a:t>
             </a:fld>
             <a:endParaRPr lang="en-US"/>
           </a:p>
@@ -1230,7 +1232,7 @@
           <a:p>
             <a:fld id="{3A99376B-ADBF-4BED-A802-ABAD07EED65B}" type="slidenum">
               <a:rPr lang="en-US" smtClean="0"/>
-              <a:t>27</a:t>
+              <a:t>29</a:t>
             </a:fld>
             <a:endParaRPr lang="en-US"/>
           </a:p>
@@ -1380,7 +1382,7 @@
           <a:p>
             <a:fld id="{3BBA5F19-0A58-430F-853A-2A12FA5EF2AB}" type="datetimeFigureOut">
               <a:rPr lang="en-US" smtClean="0"/>
-              <a:t>2025-09-29</a:t>
+              <a:t>10/1/2025</a:t>
             </a:fld>
             <a:endParaRPr lang="en-US"/>
           </a:p>
@@ -1550,7 +1552,7 @@
           <a:p>
             <a:fld id="{3BBA5F19-0A58-430F-853A-2A12FA5EF2AB}" type="datetimeFigureOut">
               <a:rPr lang="en-US" smtClean="0"/>
-              <a:t>2025-09-29</a:t>
+              <a:t>10/1/2025</a:t>
             </a:fld>
             <a:endParaRPr lang="en-US"/>
           </a:p>
@@ -1730,7 +1732,7 @@
           <a:p>
             <a:fld id="{3BBA5F19-0A58-430F-853A-2A12FA5EF2AB}" type="datetimeFigureOut">
               <a:rPr lang="en-US" smtClean="0"/>
-              <a:t>2025-09-29</a:t>
+              <a:t>10/1/2025</a:t>
             </a:fld>
             <a:endParaRPr lang="en-US"/>
           </a:p>
@@ -1900,7 +1902,7 @@
           <a:p>
             <a:fld id="{3BBA5F19-0A58-430F-853A-2A12FA5EF2AB}" type="datetimeFigureOut">
               <a:rPr lang="en-US" smtClean="0"/>
-              <a:t>2025-09-29</a:t>
+              <a:t>10/1/2025</a:t>
             </a:fld>
             <a:endParaRPr lang="en-US"/>
           </a:p>
@@ -2146,7 +2148,7 @@
           <a:p>
             <a:fld id="{3BBA5F19-0A58-430F-853A-2A12FA5EF2AB}" type="datetimeFigureOut">
               <a:rPr lang="en-US" smtClean="0"/>
-              <a:t>2025-09-29</a:t>
+              <a:t>10/1/2025</a:t>
             </a:fld>
             <a:endParaRPr lang="en-US"/>
           </a:p>
@@ -2378,7 +2380,7 @@
           <a:p>
             <a:fld id="{3BBA5F19-0A58-430F-853A-2A12FA5EF2AB}" type="datetimeFigureOut">
               <a:rPr lang="en-US" smtClean="0"/>
-              <a:t>2025-09-29</a:t>
+              <a:t>10/1/2025</a:t>
             </a:fld>
             <a:endParaRPr lang="en-US"/>
           </a:p>
@@ -2745,7 +2747,7 @@
           <a:p>
             <a:fld id="{3BBA5F19-0A58-430F-853A-2A12FA5EF2AB}" type="datetimeFigureOut">
               <a:rPr lang="en-US" smtClean="0"/>
-              <a:t>2025-09-29</a:t>
+              <a:t>10/1/2025</a:t>
             </a:fld>
             <a:endParaRPr lang="en-US"/>
           </a:p>
@@ -2863,7 +2865,7 @@
           <a:p>
             <a:fld id="{3BBA5F19-0A58-430F-853A-2A12FA5EF2AB}" type="datetimeFigureOut">
               <a:rPr lang="en-US" smtClean="0"/>
-              <a:t>2025-09-29</a:t>
+              <a:t>10/1/2025</a:t>
             </a:fld>
             <a:endParaRPr lang="en-US"/>
           </a:p>
@@ -2958,7 +2960,7 @@
           <a:p>
             <a:fld id="{3BBA5F19-0A58-430F-853A-2A12FA5EF2AB}" type="datetimeFigureOut">
               <a:rPr lang="en-US" smtClean="0"/>
-              <a:t>2025-09-29</a:t>
+              <a:t>10/1/2025</a:t>
             </a:fld>
             <a:endParaRPr lang="en-US"/>
           </a:p>
@@ -3235,7 +3237,7 @@
           <a:p>
             <a:fld id="{3BBA5F19-0A58-430F-853A-2A12FA5EF2AB}" type="datetimeFigureOut">
               <a:rPr lang="en-US" smtClean="0"/>
-              <a:t>2025-09-29</a:t>
+              <a:t>10/1/2025</a:t>
             </a:fld>
             <a:endParaRPr lang="en-US"/>
           </a:p>
@@ -3492,7 +3494,7 @@
           <a:p>
             <a:fld id="{3BBA5F19-0A58-430F-853A-2A12FA5EF2AB}" type="datetimeFigureOut">
               <a:rPr lang="en-US" smtClean="0"/>
-              <a:t>2025-09-29</a:t>
+              <a:t>10/1/2025</a:t>
             </a:fld>
             <a:endParaRPr lang="en-US"/>
           </a:p>
@@ -3705,7 +3707,7 @@
           <a:p>
             <a:fld id="{3BBA5F19-0A58-430F-853A-2A12FA5EF2AB}" type="datetimeFigureOut">
               <a:rPr lang="en-US" smtClean="0"/>
-              <a:t>2025-09-29</a:t>
+              <a:t>10/1/2025</a:t>
             </a:fld>
             <a:endParaRPr lang="en-US"/>
           </a:p>
@@ -4983,6 +4985,96 @@
       </p:grpSpPr>
       <p:sp>
         <p:nvSpPr>
+          <p:cNvPr id="4" name="Title 3">
+            <a:extLst>
+              <a:ext uri="{FF2B5EF4-FFF2-40B4-BE49-F238E27FC236}">
+                <a16:creationId xmlns:a16="http://schemas.microsoft.com/office/drawing/2014/main" id="{34F2D000-2D08-138A-A4CD-300DF3D244EB}"/>
+              </a:ext>
+            </a:extLst>
+          </p:cNvPr>
+          <p:cNvSpPr>
+            <a:spLocks noGrp="1"/>
+          </p:cNvSpPr>
+          <p:nvPr>
+            <p:ph type="title"/>
+          </p:nvPr>
+        </p:nvSpPr>
+        <p:spPr/>
+        <p:txBody>
+          <a:bodyPr/>
+          <a:lstStyle/>
+          <a:p>
+            <a:r>
+              <a:rPr lang="en-US" dirty="0"/>
+              <a:t>Crude Oil is in a downtrend since 2023</a:t>
+            </a:r>
+          </a:p>
+        </p:txBody>
+      </p:sp>
+      <p:pic>
+        <p:nvPicPr>
+          <p:cNvPr id="11" name="Content Placeholder 10">
+            <a:extLst>
+              <a:ext uri="{FF2B5EF4-FFF2-40B4-BE49-F238E27FC236}">
+                <a16:creationId xmlns:a16="http://schemas.microsoft.com/office/drawing/2014/main" id="{6861B697-5706-5EBE-792F-0ACF6B1127E5}"/>
+              </a:ext>
+            </a:extLst>
+          </p:cNvPr>
+          <p:cNvPicPr>
+            <a:picLocks noGrp="1" noChangeAspect="1"/>
+          </p:cNvPicPr>
+          <p:nvPr>
+            <p:ph idx="1"/>
+          </p:nvPr>
+        </p:nvPicPr>
+        <p:blipFill>
+          <a:blip r:embed="rId2"/>
+          <a:stretch>
+            <a:fillRect/>
+          </a:stretch>
+        </p:blipFill>
+        <p:spPr>
+          <a:xfrm>
+            <a:off x="1522481" y="1497331"/>
+            <a:ext cx="9147038" cy="5196840"/>
+          </a:xfrm>
+          <a:prstGeom prst="rect">
+            <a:avLst/>
+          </a:prstGeom>
+        </p:spPr>
+      </p:pic>
+    </p:spTree>
+    <p:extLst>
+      <p:ext uri="{BB962C8B-B14F-4D97-AF65-F5344CB8AC3E}">
+        <p14:creationId xmlns:p14="http://schemas.microsoft.com/office/powerpoint/2010/main" val="3327590972"/>
+      </p:ext>
+    </p:extLst>
+  </p:cSld>
+  <p:clrMapOvr>
+    <a:masterClrMapping/>
+  </p:clrMapOvr>
+</p:sld>
+</file>
+
+<file path=ppt/slides/slide17.xml><?xml version="1.0" encoding="utf-8"?>
+<p:sld xmlns:a="http://schemas.openxmlformats.org/drawingml/2006/main" xmlns:r="http://schemas.openxmlformats.org/officeDocument/2006/relationships" xmlns:p="http://schemas.openxmlformats.org/presentationml/2006/main">
+  <p:cSld>
+    <p:spTree>
+      <p:nvGrpSpPr>
+        <p:cNvPr id="1" name=""/>
+        <p:cNvGrpSpPr/>
+        <p:nvPr/>
+      </p:nvGrpSpPr>
+      <p:grpSpPr>
+        <a:xfrm>
+          <a:off x="0" y="0"/>
+          <a:ext cx="0" cy="0"/>
+          <a:chOff x="0" y="0"/>
+          <a:chExt cx="0" cy="0"/>
+        </a:xfrm>
+      </p:grpSpPr>
+      <p:sp>
+        <p:nvSpPr>
           <p:cNvPr id="9" name="Title 8">
             <a:extLst>
               <a:ext uri="{FF2B5EF4-FFF2-40B4-BE49-F238E27FC236}">
@@ -5129,7 +5221,7 @@
 </p:sld>
 </file>
 
-<file path=ppt/slides/slide17.xml><?xml version="1.0" encoding="utf-8"?>
+<file path=ppt/slides/slide18.xml><?xml version="1.0" encoding="utf-8"?>
 <p:sld xmlns:a="http://schemas.openxmlformats.org/drawingml/2006/main" xmlns:r="http://schemas.openxmlformats.org/officeDocument/2006/relationships" xmlns:p="http://schemas.openxmlformats.org/presentationml/2006/main">
   <p:cSld>
     <p:spTree>
@@ -5262,7 +5354,7 @@
 </p:sld>
 </file>
 
-<file path=ppt/slides/slide18.xml><?xml version="1.0" encoding="utf-8"?>
+<file path=ppt/slides/slide19.xml><?xml version="1.0" encoding="utf-8"?>
 <p:sld xmlns:a="http://schemas.openxmlformats.org/drawingml/2006/main" xmlns:r="http://schemas.openxmlformats.org/officeDocument/2006/relationships" xmlns:p="http://schemas.openxmlformats.org/presentationml/2006/main">
   <p:cSld>
     <p:spTree>
@@ -5462,95 +5554,6 @@
     <p:extLst>
       <p:ext uri="{BB962C8B-B14F-4D97-AF65-F5344CB8AC3E}">
         <p14:creationId xmlns:p14="http://schemas.microsoft.com/office/powerpoint/2010/main" val="3952441491"/>
-      </p:ext>
-    </p:extLst>
-  </p:cSld>
-  <p:clrMapOvr>
-    <a:masterClrMapping/>
-  </p:clrMapOvr>
-</p:sld>
-</file>
-
-<file path=ppt/slides/slide19.xml><?xml version="1.0" encoding="utf-8"?>
-<p:sld xmlns:a="http://schemas.openxmlformats.org/drawingml/2006/main" xmlns:r="http://schemas.openxmlformats.org/officeDocument/2006/relationships" xmlns:p="http://schemas.openxmlformats.org/presentationml/2006/main">
-  <p:cSld>
-    <p:spTree>
-      <p:nvGrpSpPr>
-        <p:cNvPr id="1" name="">
-          <a:extLst>
-            <a:ext uri="{FF2B5EF4-FFF2-40B4-BE49-F238E27FC236}">
-              <a16:creationId xmlns:a16="http://schemas.microsoft.com/office/drawing/2014/main" id="{6DDF2AB2-6393-6872-57EB-BFFCAFA0589A}"/>
-            </a:ext>
-          </a:extLst>
-        </p:cNvPr>
-        <p:cNvGrpSpPr/>
-        <p:nvPr/>
-      </p:nvGrpSpPr>
-      <p:grpSpPr>
-        <a:xfrm>
-          <a:off x="0" y="0"/>
-          <a:ext cx="0" cy="0"/>
-          <a:chOff x="0" y="0"/>
-          <a:chExt cx="0" cy="0"/>
-        </a:xfrm>
-      </p:grpSpPr>
-      <p:sp>
-        <p:nvSpPr>
-          <p:cNvPr id="2" name="Title 1">
-            <a:extLst>
-              <a:ext uri="{FF2B5EF4-FFF2-40B4-BE49-F238E27FC236}">
-                <a16:creationId xmlns:a16="http://schemas.microsoft.com/office/drawing/2014/main" id="{12DD5ED4-F806-7131-B2F9-97E3771D5EEE}"/>
-              </a:ext>
-            </a:extLst>
-          </p:cNvPr>
-          <p:cNvSpPr>
-            <a:spLocks noGrp="1"/>
-          </p:cNvSpPr>
-          <p:nvPr>
-            <p:ph type="title"/>
-          </p:nvPr>
-        </p:nvSpPr>
-        <p:spPr/>
-        <p:txBody>
-          <a:bodyPr/>
-          <a:lstStyle/>
-          <a:p>
-            <a:r>
-              <a:rPr lang="en-US" dirty="0"/>
-              <a:t>U.S. Dollar</a:t>
-            </a:r>
-          </a:p>
-        </p:txBody>
-      </p:sp>
-      <p:sp>
-        <p:nvSpPr>
-          <p:cNvPr id="3" name="Text Placeholder 2">
-            <a:extLst>
-              <a:ext uri="{FF2B5EF4-FFF2-40B4-BE49-F238E27FC236}">
-                <a16:creationId xmlns:a16="http://schemas.microsoft.com/office/drawing/2014/main" id="{F71D4701-1E88-7BD3-B4D6-1D79CE70BB42}"/>
-              </a:ext>
-            </a:extLst>
-          </p:cNvPr>
-          <p:cNvSpPr>
-            <a:spLocks noGrp="1"/>
-          </p:cNvSpPr>
-          <p:nvPr>
-            <p:ph type="body" idx="1"/>
-          </p:nvPr>
-        </p:nvSpPr>
-        <p:spPr/>
-        <p:txBody>
-          <a:bodyPr/>
-          <a:lstStyle/>
-          <a:p>
-            <a:endParaRPr lang="en-US"/>
-          </a:p>
-        </p:txBody>
-      </p:sp>
-    </p:spTree>
-    <p:extLst>
-      <p:ext uri="{BB962C8B-B14F-4D97-AF65-F5344CB8AC3E}">
-        <p14:creationId xmlns:p14="http://schemas.microsoft.com/office/powerpoint/2010/main" val="1537158543"/>
       </p:ext>
     </p:extLst>
   </p:cSld>
@@ -5632,11 +5635,11 @@
               <a:buAutoNum type="arabicPeriod"/>
             </a:pPr>
             <a:r>
-              <a:rPr lang="en-US" b="1"/>
+              <a:rPr lang="en-US" b="1" dirty="0"/>
               <a:t>Technical Analysis</a:t>
             </a:r>
             <a:r>
-              <a:rPr lang="en-US"/>
+              <a:rPr lang="en-US" dirty="0"/>
               <a:t>: Discretionary price and volume analysis</a:t>
             </a:r>
           </a:p>
@@ -5646,11 +5649,11 @@
               <a:buAutoNum type="arabicPeriod"/>
             </a:pPr>
             <a:r>
-              <a:rPr lang="en-US" b="1"/>
+              <a:rPr lang="en-US" b="1" dirty="0"/>
               <a:t>Quantitative Analysis</a:t>
             </a:r>
             <a:r>
-              <a:rPr lang="en-US"/>
+              <a:rPr lang="en-US" dirty="0"/>
               <a:t>: Applying statistics and machine learning</a:t>
             </a:r>
           </a:p>
@@ -5660,11 +5663,11 @@
               <a:buAutoNum type="arabicPeriod"/>
             </a:pPr>
             <a:r>
-              <a:rPr lang="en-US" b="1"/>
+              <a:rPr lang="en-US" b="1" dirty="0"/>
               <a:t>Sentiment Analysis</a:t>
             </a:r>
             <a:r>
-              <a:rPr lang="en-US"/>
+              <a:rPr lang="en-US" dirty="0"/>
               <a:t>: General sentiment of market participants</a:t>
             </a:r>
           </a:p>
@@ -5674,12 +5677,12 @@
               <a:buAutoNum type="arabicPeriod"/>
             </a:pPr>
             <a:r>
-              <a:rPr lang="en-US" b="1"/>
+              <a:rPr lang="en-US" b="1" dirty="0"/>
               <a:t>Fundamental Analysis</a:t>
             </a:r>
             <a:r>
-              <a:rPr lang="en-US"/>
-              <a:t>: Economical theories on value and equilibrium levels, and supply and demand</a:t>
+              <a:rPr lang="en-US" dirty="0"/>
+              <a:t>: Economics and finance theories on value, equilibrium levels, and supply and demand</a:t>
             </a:r>
           </a:p>
           <a:p>
@@ -5701,6 +5704,185 @@
 </file>
 
 <file path=ppt/slides/slide20.xml><?xml version="1.0" encoding="utf-8"?>
+<p:sld xmlns:a="http://schemas.openxmlformats.org/drawingml/2006/main" xmlns:r="http://schemas.openxmlformats.org/officeDocument/2006/relationships" xmlns:p="http://schemas.openxmlformats.org/presentationml/2006/main">
+  <p:cSld>
+    <p:spTree>
+      <p:nvGrpSpPr>
+        <p:cNvPr id="1" name="">
+          <a:extLst>
+            <a:ext uri="{FF2B5EF4-FFF2-40B4-BE49-F238E27FC236}">
+              <a16:creationId xmlns:a16="http://schemas.microsoft.com/office/drawing/2014/main" id="{6DDF2AB2-6393-6872-57EB-BFFCAFA0589A}"/>
+            </a:ext>
+          </a:extLst>
+        </p:cNvPr>
+        <p:cNvGrpSpPr/>
+        <p:nvPr/>
+      </p:nvGrpSpPr>
+      <p:grpSpPr>
+        <a:xfrm>
+          <a:off x="0" y="0"/>
+          <a:ext cx="0" cy="0"/>
+          <a:chOff x="0" y="0"/>
+          <a:chExt cx="0" cy="0"/>
+        </a:xfrm>
+      </p:grpSpPr>
+      <p:sp>
+        <p:nvSpPr>
+          <p:cNvPr id="2" name="Title 1">
+            <a:extLst>
+              <a:ext uri="{FF2B5EF4-FFF2-40B4-BE49-F238E27FC236}">
+                <a16:creationId xmlns:a16="http://schemas.microsoft.com/office/drawing/2014/main" id="{12DD5ED4-F806-7131-B2F9-97E3771D5EEE}"/>
+              </a:ext>
+            </a:extLst>
+          </p:cNvPr>
+          <p:cNvSpPr>
+            <a:spLocks noGrp="1"/>
+          </p:cNvSpPr>
+          <p:nvPr>
+            <p:ph type="title"/>
+          </p:nvPr>
+        </p:nvSpPr>
+        <p:spPr/>
+        <p:txBody>
+          <a:bodyPr/>
+          <a:lstStyle/>
+          <a:p>
+            <a:r>
+              <a:rPr lang="en-US" dirty="0"/>
+              <a:t>U.S. Dollar</a:t>
+            </a:r>
+          </a:p>
+        </p:txBody>
+      </p:sp>
+      <p:sp>
+        <p:nvSpPr>
+          <p:cNvPr id="3" name="Text Placeholder 2">
+            <a:extLst>
+              <a:ext uri="{FF2B5EF4-FFF2-40B4-BE49-F238E27FC236}">
+                <a16:creationId xmlns:a16="http://schemas.microsoft.com/office/drawing/2014/main" id="{F71D4701-1E88-7BD3-B4D6-1D79CE70BB42}"/>
+              </a:ext>
+            </a:extLst>
+          </p:cNvPr>
+          <p:cNvSpPr>
+            <a:spLocks noGrp="1"/>
+          </p:cNvSpPr>
+          <p:nvPr>
+            <p:ph type="body" idx="1"/>
+          </p:nvPr>
+        </p:nvSpPr>
+        <p:spPr/>
+        <p:txBody>
+          <a:bodyPr/>
+          <a:lstStyle/>
+          <a:p>
+            <a:endParaRPr lang="en-US"/>
+          </a:p>
+        </p:txBody>
+      </p:sp>
+    </p:spTree>
+    <p:extLst>
+      <p:ext uri="{BB962C8B-B14F-4D97-AF65-F5344CB8AC3E}">
+        <p14:creationId xmlns:p14="http://schemas.microsoft.com/office/powerpoint/2010/main" val="1537158543"/>
+      </p:ext>
+    </p:extLst>
+  </p:cSld>
+  <p:clrMapOvr>
+    <a:masterClrMapping/>
+  </p:clrMapOvr>
+</p:sld>
+</file>
+
+<file path=ppt/slides/slide21.xml><?xml version="1.0" encoding="utf-8"?>
+<p:sld xmlns:a="http://schemas.openxmlformats.org/drawingml/2006/main" xmlns:r="http://schemas.openxmlformats.org/officeDocument/2006/relationships" xmlns:p="http://schemas.openxmlformats.org/presentationml/2006/main">
+  <p:cSld>
+    <p:spTree>
+      <p:nvGrpSpPr>
+        <p:cNvPr id="1" name=""/>
+        <p:cNvGrpSpPr/>
+        <p:nvPr/>
+      </p:nvGrpSpPr>
+      <p:grpSpPr>
+        <a:xfrm>
+          <a:off x="0" y="0"/>
+          <a:ext cx="0" cy="0"/>
+          <a:chOff x="0" y="0"/>
+          <a:chExt cx="0" cy="0"/>
+        </a:xfrm>
+      </p:grpSpPr>
+      <p:sp>
+        <p:nvSpPr>
+          <p:cNvPr id="2" name="Title 1">
+            <a:extLst>
+              <a:ext uri="{FF2B5EF4-FFF2-40B4-BE49-F238E27FC236}">
+                <a16:creationId xmlns:a16="http://schemas.microsoft.com/office/drawing/2014/main" id="{25BDDC47-2493-3CD5-FC43-B9BCE3C39C0C}"/>
+              </a:ext>
+            </a:extLst>
+          </p:cNvPr>
+          <p:cNvSpPr>
+            <a:spLocks noGrp="1"/>
+          </p:cNvSpPr>
+          <p:nvPr>
+            <p:ph type="title"/>
+          </p:nvPr>
+        </p:nvSpPr>
+        <p:spPr/>
+        <p:txBody>
+          <a:bodyPr/>
+          <a:lstStyle/>
+          <a:p>
+            <a:r>
+              <a:rPr lang="en-US" dirty="0"/>
+              <a:t>Dollar is in an uptrend since 2014</a:t>
+            </a:r>
+          </a:p>
+        </p:txBody>
+      </p:sp>
+      <p:pic>
+        <p:nvPicPr>
+          <p:cNvPr id="5" name="Content Placeholder 4">
+            <a:extLst>
+              <a:ext uri="{FF2B5EF4-FFF2-40B4-BE49-F238E27FC236}">
+                <a16:creationId xmlns:a16="http://schemas.microsoft.com/office/drawing/2014/main" id="{8107719B-5354-2F96-3A63-BDBF775DAD1C}"/>
+              </a:ext>
+            </a:extLst>
+          </p:cNvPr>
+          <p:cNvPicPr>
+            <a:picLocks noGrp="1" noChangeAspect="1"/>
+          </p:cNvPicPr>
+          <p:nvPr>
+            <p:ph idx="1"/>
+          </p:nvPr>
+        </p:nvPicPr>
+        <p:blipFill>
+          <a:blip r:embed="rId2"/>
+          <a:stretch>
+            <a:fillRect/>
+          </a:stretch>
+        </p:blipFill>
+        <p:spPr>
+          <a:xfrm>
+            <a:off x="1408658" y="1417320"/>
+            <a:ext cx="9374683" cy="5326175"/>
+          </a:xfrm>
+          <a:prstGeom prst="rect">
+            <a:avLst/>
+          </a:prstGeom>
+        </p:spPr>
+      </p:pic>
+    </p:spTree>
+    <p:extLst>
+      <p:ext uri="{BB962C8B-B14F-4D97-AF65-F5344CB8AC3E}">
+        <p14:creationId xmlns:p14="http://schemas.microsoft.com/office/powerpoint/2010/main" val="3795185799"/>
+      </p:ext>
+    </p:extLst>
+  </p:cSld>
+  <p:clrMapOvr>
+    <a:masterClrMapping/>
+  </p:clrMapOvr>
+</p:sld>
+</file>
+
+<file path=ppt/slides/slide22.xml><?xml version="1.0" encoding="utf-8"?>
 <p:sld xmlns:a="http://schemas.openxmlformats.org/drawingml/2006/main" xmlns:r="http://schemas.openxmlformats.org/officeDocument/2006/relationships" xmlns:p="http://schemas.openxmlformats.org/presentationml/2006/main">
   <p:cSld>
     <p:spTree>
@@ -5790,7 +5972,7 @@
 </p:sld>
 </file>
 
-<file path=ppt/slides/slide21.xml><?xml version="1.0" encoding="utf-8"?>
+<file path=ppt/slides/slide23.xml><?xml version="1.0" encoding="utf-8"?>
 <p:sld xmlns:a="http://schemas.openxmlformats.org/drawingml/2006/main" xmlns:r="http://schemas.openxmlformats.org/officeDocument/2006/relationships" xmlns:p="http://schemas.openxmlformats.org/presentationml/2006/main">
   <p:cSld>
     <p:spTree>
@@ -5955,7 +6137,7 @@
 </p:sld>
 </file>
 
-<file path=ppt/slides/slide22.xml><?xml version="1.0" encoding="utf-8"?>
+<file path=ppt/slides/slide24.xml><?xml version="1.0" encoding="utf-8"?>
 <p:sld xmlns:a="http://schemas.openxmlformats.org/drawingml/2006/main" xmlns:r="http://schemas.openxmlformats.org/officeDocument/2006/relationships" xmlns:p="http://schemas.openxmlformats.org/presentationml/2006/main">
   <p:cSld>
     <p:spTree>
@@ -6088,7 +6270,7 @@
 </p:sld>
 </file>
 
-<file path=ppt/slides/slide23.xml><?xml version="1.0" encoding="utf-8"?>
+<file path=ppt/slides/slide25.xml><?xml version="1.0" encoding="utf-8"?>
 <p:sld xmlns:a="http://schemas.openxmlformats.org/drawingml/2006/main" xmlns:r="http://schemas.openxmlformats.org/officeDocument/2006/relationships" xmlns:p="http://schemas.openxmlformats.org/presentationml/2006/main">
   <p:cSld>
     <p:spTree>
@@ -6171,7 +6353,7 @@
 </p:sld>
 </file>
 
-<file path=ppt/slides/slide24.xml><?xml version="1.0" encoding="utf-8"?>
+<file path=ppt/slides/slide26.xml><?xml version="1.0" encoding="utf-8"?>
 <p:sld xmlns:a="http://schemas.openxmlformats.org/drawingml/2006/main" xmlns:r="http://schemas.openxmlformats.org/officeDocument/2006/relationships" xmlns:p="http://schemas.openxmlformats.org/presentationml/2006/main">
   <p:cSld>
     <p:spTree>
@@ -6211,7 +6393,7 @@
           <a:p>
             <a:r>
               <a:rPr lang="en-US" dirty="0"/>
-              <a:t>Forecasting Exchange Rates</a:t>
+              <a:t>Forecasting Exchange Rates is Very Difficult</a:t>
             </a:r>
           </a:p>
         </p:txBody>
@@ -6333,7 +6515,7 @@
 </p:sld>
 </file>
 
-<file path=ppt/slides/slide25.xml><?xml version="1.0" encoding="utf-8"?>
+<file path=ppt/slides/slide27.xml><?xml version="1.0" encoding="utf-8"?>
 <p:sld xmlns:a="http://schemas.openxmlformats.org/drawingml/2006/main" xmlns:r="http://schemas.openxmlformats.org/officeDocument/2006/relationships" xmlns:p="http://schemas.openxmlformats.org/presentationml/2006/main">
   <p:cSld>
     <p:spTree>
@@ -6605,7 +6787,7 @@
 </p:sld>
 </file>
 
-<file path=ppt/slides/slide26.xml><?xml version="1.0" encoding="utf-8"?>
+<file path=ppt/slides/slide28.xml><?xml version="1.0" encoding="utf-8"?>
 <p:sld xmlns:a="http://schemas.openxmlformats.org/drawingml/2006/main" xmlns:r="http://schemas.openxmlformats.org/officeDocument/2006/relationships" xmlns:p="http://schemas.openxmlformats.org/presentationml/2006/main">
   <p:cSld>
     <p:spTree>
@@ -6695,7 +6877,7 @@
 </p:sld>
 </file>
 
-<file path=ppt/slides/slide27.xml><?xml version="1.0" encoding="utf-8"?>
+<file path=ppt/slides/slide29.xml><?xml version="1.0" encoding="utf-8"?>
 <p:sld xmlns:a="http://schemas.openxmlformats.org/drawingml/2006/main" xmlns:r="http://schemas.openxmlformats.org/officeDocument/2006/relationships" xmlns:p="http://schemas.openxmlformats.org/presentationml/2006/main">
   <p:cSld>
     <p:spTree>
@@ -6967,202 +7149,6 @@
 </p:sld>
 </file>
 
-<file path=ppt/slides/slide28.xml><?xml version="1.0" encoding="utf-8"?>
-<p:sld xmlns:a="http://schemas.openxmlformats.org/drawingml/2006/main" xmlns:r="http://schemas.openxmlformats.org/officeDocument/2006/relationships" xmlns:p="http://schemas.openxmlformats.org/presentationml/2006/main">
-  <p:cSld>
-    <p:spTree>
-      <p:nvGrpSpPr>
-        <p:cNvPr id="1" name=""/>
-        <p:cNvGrpSpPr/>
-        <p:nvPr/>
-      </p:nvGrpSpPr>
-      <p:grpSpPr>
-        <a:xfrm>
-          <a:off x="0" y="0"/>
-          <a:ext cx="0" cy="0"/>
-          <a:chOff x="0" y="0"/>
-          <a:chExt cx="0" cy="0"/>
-        </a:xfrm>
-      </p:grpSpPr>
-      <p:sp>
-        <p:nvSpPr>
-          <p:cNvPr id="2" name="Title 1">
-            <a:extLst>
-              <a:ext uri="{FF2B5EF4-FFF2-40B4-BE49-F238E27FC236}">
-                <a16:creationId xmlns:a16="http://schemas.microsoft.com/office/drawing/2014/main" id="{96187574-30A3-5FAA-344E-634236DB3BD6}"/>
-              </a:ext>
-            </a:extLst>
-          </p:cNvPr>
-          <p:cNvSpPr>
-            <a:spLocks noGrp="1"/>
-          </p:cNvSpPr>
-          <p:nvPr>
-            <p:ph type="title"/>
-          </p:nvPr>
-        </p:nvSpPr>
-        <p:spPr/>
-        <p:txBody>
-          <a:bodyPr/>
-          <a:lstStyle/>
-          <a:p>
-            <a:r>
-              <a:rPr lang="en-US" dirty="0"/>
-              <a:t>Conclusion</a:t>
-            </a:r>
-          </a:p>
-        </p:txBody>
-      </p:sp>
-      <p:sp>
-        <p:nvSpPr>
-          <p:cNvPr id="3" name="Text Placeholder 2">
-            <a:extLst>
-              <a:ext uri="{FF2B5EF4-FFF2-40B4-BE49-F238E27FC236}">
-                <a16:creationId xmlns:a16="http://schemas.microsoft.com/office/drawing/2014/main" id="{E82B0123-1105-CEDF-A011-7470CFA351EC}"/>
-              </a:ext>
-            </a:extLst>
-          </p:cNvPr>
-          <p:cNvSpPr>
-            <a:spLocks noGrp="1"/>
-          </p:cNvSpPr>
-          <p:nvPr>
-            <p:ph type="body" idx="1"/>
-          </p:nvPr>
-        </p:nvSpPr>
-        <p:spPr/>
-        <p:txBody>
-          <a:bodyPr/>
-          <a:lstStyle/>
-          <a:p>
-            <a:r>
-              <a:rPr lang="en-US" dirty="0"/>
-              <a:t>CAD/USD Bearish Outlook for 2026</a:t>
-            </a:r>
-          </a:p>
-        </p:txBody>
-      </p:sp>
-    </p:spTree>
-    <p:extLst>
-      <p:ext uri="{BB962C8B-B14F-4D97-AF65-F5344CB8AC3E}">
-        <p14:creationId xmlns:p14="http://schemas.microsoft.com/office/powerpoint/2010/main" val="3618783459"/>
-      </p:ext>
-    </p:extLst>
-  </p:cSld>
-  <p:clrMapOvr>
-    <a:masterClrMapping/>
-  </p:clrMapOvr>
-</p:sld>
-</file>
-
-<file path=ppt/slides/slide29.xml><?xml version="1.0" encoding="utf-8"?>
-<p:sld xmlns:a="http://schemas.openxmlformats.org/drawingml/2006/main" xmlns:r="http://schemas.openxmlformats.org/officeDocument/2006/relationships" xmlns:p="http://schemas.openxmlformats.org/presentationml/2006/main">
-  <p:cSld>
-    <p:spTree>
-      <p:nvGrpSpPr>
-        <p:cNvPr id="1" name=""/>
-        <p:cNvGrpSpPr/>
-        <p:nvPr/>
-      </p:nvGrpSpPr>
-      <p:grpSpPr>
-        <a:xfrm>
-          <a:off x="0" y="0"/>
-          <a:ext cx="0" cy="0"/>
-          <a:chOff x="0" y="0"/>
-          <a:chExt cx="0" cy="0"/>
-        </a:xfrm>
-      </p:grpSpPr>
-      <p:sp>
-        <p:nvSpPr>
-          <p:cNvPr id="4" name="Title 3">
-            <a:extLst>
-              <a:ext uri="{FF2B5EF4-FFF2-40B4-BE49-F238E27FC236}">
-                <a16:creationId xmlns:a16="http://schemas.microsoft.com/office/drawing/2014/main" id="{CA76C0B7-99E4-240F-ADFA-256AD5CB968F}"/>
-              </a:ext>
-            </a:extLst>
-          </p:cNvPr>
-          <p:cNvSpPr>
-            <a:spLocks noGrp="1"/>
-          </p:cNvSpPr>
-          <p:nvPr>
-            <p:ph type="title"/>
-          </p:nvPr>
-        </p:nvSpPr>
-        <p:spPr/>
-        <p:txBody>
-          <a:bodyPr/>
-          <a:lstStyle/>
-          <a:p>
-            <a:r>
-              <a:rPr lang="en-US" dirty="0"/>
-              <a:t>Recap</a:t>
-            </a:r>
-          </a:p>
-        </p:txBody>
-      </p:sp>
-      <p:sp>
-        <p:nvSpPr>
-          <p:cNvPr id="5" name="Content Placeholder 4">
-            <a:extLst>
-              <a:ext uri="{FF2B5EF4-FFF2-40B4-BE49-F238E27FC236}">
-                <a16:creationId xmlns:a16="http://schemas.microsoft.com/office/drawing/2014/main" id="{B3D1EB59-8E10-96BE-BBA5-0D310BF762B2}"/>
-              </a:ext>
-            </a:extLst>
-          </p:cNvPr>
-          <p:cNvSpPr>
-            <a:spLocks noGrp="1"/>
-          </p:cNvSpPr>
-          <p:nvPr>
-            <p:ph idx="1"/>
-          </p:nvPr>
-        </p:nvSpPr>
-        <p:spPr/>
-        <p:txBody>
-          <a:bodyPr/>
-          <a:lstStyle/>
-          <a:p>
-            <a:r>
-              <a:rPr lang="en-US" dirty="0"/>
-              <a:t>Economic growth projected to slow in 2026</a:t>
-            </a:r>
-          </a:p>
-          <a:p>
-            <a:r>
-              <a:rPr lang="en-US" dirty="0"/>
-              <a:t>Oil demand declines while inventories rise, signaling oversupply</a:t>
-            </a:r>
-          </a:p>
-          <a:p>
-            <a:r>
-              <a:rPr lang="en-US" dirty="0"/>
-              <a:t>After a period of weakness due to Tariffs, the U.S. dollar rebounds in 2026</a:t>
-            </a:r>
-          </a:p>
-          <a:p>
-            <a:r>
-              <a:rPr lang="en-US" dirty="0"/>
-              <a:t>CAD/USD is positively correlated with oil prices and negatively correlated with the dollar index</a:t>
-            </a:r>
-          </a:p>
-          <a:p>
-            <a:r>
-              <a:rPr lang="en-US" dirty="0"/>
-              <a:t>The CAD/USD downtrend persists into 2026, continuing the decline initiated in 2022.</a:t>
-            </a:r>
-          </a:p>
-        </p:txBody>
-      </p:sp>
-    </p:spTree>
-    <p:extLst>
-      <p:ext uri="{BB962C8B-B14F-4D97-AF65-F5344CB8AC3E}">
-        <p14:creationId xmlns:p14="http://schemas.microsoft.com/office/powerpoint/2010/main" val="2636756083"/>
-      </p:ext>
-    </p:extLst>
-  </p:cSld>
-  <p:clrMapOvr>
-    <a:masterClrMapping/>
-  </p:clrMapOvr>
-</p:sld>
-</file>
-
 <file path=ppt/slides/slide3.xml><?xml version="1.0" encoding="utf-8"?>
 <p:sld xmlns:a="http://schemas.openxmlformats.org/drawingml/2006/main" xmlns:r="http://schemas.openxmlformats.org/officeDocument/2006/relationships" xmlns:p="http://schemas.openxmlformats.org/presentationml/2006/main">
   <p:cSld>
@@ -7238,6 +7224,202 @@
     <p:extLst>
       <p:ext uri="{BB962C8B-B14F-4D97-AF65-F5344CB8AC3E}">
         <p14:creationId xmlns:p14="http://schemas.microsoft.com/office/powerpoint/2010/main" val="591847203"/>
+      </p:ext>
+    </p:extLst>
+  </p:cSld>
+  <p:clrMapOvr>
+    <a:masterClrMapping/>
+  </p:clrMapOvr>
+</p:sld>
+</file>
+
+<file path=ppt/slides/slide30.xml><?xml version="1.0" encoding="utf-8"?>
+<p:sld xmlns:a="http://schemas.openxmlformats.org/drawingml/2006/main" xmlns:r="http://schemas.openxmlformats.org/officeDocument/2006/relationships" xmlns:p="http://schemas.openxmlformats.org/presentationml/2006/main">
+  <p:cSld>
+    <p:spTree>
+      <p:nvGrpSpPr>
+        <p:cNvPr id="1" name=""/>
+        <p:cNvGrpSpPr/>
+        <p:nvPr/>
+      </p:nvGrpSpPr>
+      <p:grpSpPr>
+        <a:xfrm>
+          <a:off x="0" y="0"/>
+          <a:ext cx="0" cy="0"/>
+          <a:chOff x="0" y="0"/>
+          <a:chExt cx="0" cy="0"/>
+        </a:xfrm>
+      </p:grpSpPr>
+      <p:sp>
+        <p:nvSpPr>
+          <p:cNvPr id="2" name="Title 1">
+            <a:extLst>
+              <a:ext uri="{FF2B5EF4-FFF2-40B4-BE49-F238E27FC236}">
+                <a16:creationId xmlns:a16="http://schemas.microsoft.com/office/drawing/2014/main" id="{96187574-30A3-5FAA-344E-634236DB3BD6}"/>
+              </a:ext>
+            </a:extLst>
+          </p:cNvPr>
+          <p:cNvSpPr>
+            <a:spLocks noGrp="1"/>
+          </p:cNvSpPr>
+          <p:nvPr>
+            <p:ph type="title"/>
+          </p:nvPr>
+        </p:nvSpPr>
+        <p:spPr/>
+        <p:txBody>
+          <a:bodyPr/>
+          <a:lstStyle/>
+          <a:p>
+            <a:r>
+              <a:rPr lang="en-US" dirty="0"/>
+              <a:t>Conclusion</a:t>
+            </a:r>
+          </a:p>
+        </p:txBody>
+      </p:sp>
+      <p:sp>
+        <p:nvSpPr>
+          <p:cNvPr id="3" name="Text Placeholder 2">
+            <a:extLst>
+              <a:ext uri="{FF2B5EF4-FFF2-40B4-BE49-F238E27FC236}">
+                <a16:creationId xmlns:a16="http://schemas.microsoft.com/office/drawing/2014/main" id="{E82B0123-1105-CEDF-A011-7470CFA351EC}"/>
+              </a:ext>
+            </a:extLst>
+          </p:cNvPr>
+          <p:cNvSpPr>
+            <a:spLocks noGrp="1"/>
+          </p:cNvSpPr>
+          <p:nvPr>
+            <p:ph type="body" idx="1"/>
+          </p:nvPr>
+        </p:nvSpPr>
+        <p:spPr/>
+        <p:txBody>
+          <a:bodyPr/>
+          <a:lstStyle/>
+          <a:p>
+            <a:r>
+              <a:rPr lang="en-US" dirty="0"/>
+              <a:t>CAD/USD Bearish Outlook for 2026</a:t>
+            </a:r>
+          </a:p>
+        </p:txBody>
+      </p:sp>
+    </p:spTree>
+    <p:extLst>
+      <p:ext uri="{BB962C8B-B14F-4D97-AF65-F5344CB8AC3E}">
+        <p14:creationId xmlns:p14="http://schemas.microsoft.com/office/powerpoint/2010/main" val="3618783459"/>
+      </p:ext>
+    </p:extLst>
+  </p:cSld>
+  <p:clrMapOvr>
+    <a:masterClrMapping/>
+  </p:clrMapOvr>
+</p:sld>
+</file>
+
+<file path=ppt/slides/slide31.xml><?xml version="1.0" encoding="utf-8"?>
+<p:sld xmlns:a="http://schemas.openxmlformats.org/drawingml/2006/main" xmlns:r="http://schemas.openxmlformats.org/officeDocument/2006/relationships" xmlns:p="http://schemas.openxmlformats.org/presentationml/2006/main">
+  <p:cSld>
+    <p:spTree>
+      <p:nvGrpSpPr>
+        <p:cNvPr id="1" name=""/>
+        <p:cNvGrpSpPr/>
+        <p:nvPr/>
+      </p:nvGrpSpPr>
+      <p:grpSpPr>
+        <a:xfrm>
+          <a:off x="0" y="0"/>
+          <a:ext cx="0" cy="0"/>
+          <a:chOff x="0" y="0"/>
+          <a:chExt cx="0" cy="0"/>
+        </a:xfrm>
+      </p:grpSpPr>
+      <p:sp>
+        <p:nvSpPr>
+          <p:cNvPr id="4" name="Title 3">
+            <a:extLst>
+              <a:ext uri="{FF2B5EF4-FFF2-40B4-BE49-F238E27FC236}">
+                <a16:creationId xmlns:a16="http://schemas.microsoft.com/office/drawing/2014/main" id="{CA76C0B7-99E4-240F-ADFA-256AD5CB968F}"/>
+              </a:ext>
+            </a:extLst>
+          </p:cNvPr>
+          <p:cNvSpPr>
+            <a:spLocks noGrp="1"/>
+          </p:cNvSpPr>
+          <p:nvPr>
+            <p:ph type="title"/>
+          </p:nvPr>
+        </p:nvSpPr>
+        <p:spPr/>
+        <p:txBody>
+          <a:bodyPr/>
+          <a:lstStyle/>
+          <a:p>
+            <a:r>
+              <a:rPr lang="en-US" dirty="0"/>
+              <a:t>Recap</a:t>
+            </a:r>
+          </a:p>
+        </p:txBody>
+      </p:sp>
+      <p:sp>
+        <p:nvSpPr>
+          <p:cNvPr id="5" name="Content Placeholder 4">
+            <a:extLst>
+              <a:ext uri="{FF2B5EF4-FFF2-40B4-BE49-F238E27FC236}">
+                <a16:creationId xmlns:a16="http://schemas.microsoft.com/office/drawing/2014/main" id="{B3D1EB59-8E10-96BE-BBA5-0D310BF762B2}"/>
+              </a:ext>
+            </a:extLst>
+          </p:cNvPr>
+          <p:cNvSpPr>
+            <a:spLocks noGrp="1"/>
+          </p:cNvSpPr>
+          <p:nvPr>
+            <p:ph idx="1"/>
+          </p:nvPr>
+        </p:nvSpPr>
+        <p:spPr/>
+        <p:txBody>
+          <a:bodyPr/>
+          <a:lstStyle/>
+          <a:p>
+            <a:r>
+              <a:rPr lang="en-US" dirty="0"/>
+              <a:t>Economic growth projected to slow in 2026</a:t>
+            </a:r>
+          </a:p>
+          <a:p>
+            <a:r>
+              <a:rPr lang="en-US" dirty="0"/>
+              <a:t>Oil demand declines while inventories rise, signaling oversupply</a:t>
+            </a:r>
+          </a:p>
+          <a:p>
+            <a:r>
+              <a:rPr lang="en-US" dirty="0"/>
+              <a:t>After a period of weakness due to Tariffs, the U.S. dollar rebounds in 2026</a:t>
+            </a:r>
+          </a:p>
+          <a:p>
+            <a:r>
+              <a:rPr lang="en-US" dirty="0"/>
+              <a:t>CAD/USD is positively correlated with oil prices and negatively correlated with the dollar index</a:t>
+            </a:r>
+          </a:p>
+          <a:p>
+            <a:r>
+              <a:rPr lang="en-US" dirty="0"/>
+              <a:t>The CAD/USD downtrend persists into 2026, continuing the decline initiated in 2022.</a:t>
+            </a:r>
+          </a:p>
+        </p:txBody>
+      </p:sp>
+    </p:spTree>
+    <p:extLst>
+      <p:ext uri="{BB962C8B-B14F-4D97-AF65-F5344CB8AC3E}">
+        <p14:creationId xmlns:p14="http://schemas.microsoft.com/office/powerpoint/2010/main" val="2636756083"/>
       </p:ext>
     </p:extLst>
   </p:cSld>

</xml_diff>

<commit_message>
modified:   borderland/1-cadusd/Presentation/CADUSD.pptx 	modified:   borderland/2-urea/power bi/urea_international_trade.pbix 	modified:   borderland/2-urea/presentation/urea.pptx
</commit_message>
<xml_diff>
--- a/borderland/1-cadusd/Presentation/CADUSD.pptx
+++ b/borderland/1-cadusd/Presentation/CADUSD.pptx
@@ -5,40 +5,41 @@
     <p:sldMasterId id="2147483732" r:id="rId1"/>
   </p:sldMasterIdLst>
   <p:notesMasterIdLst>
-    <p:notesMasterId r:id="rId33"/>
+    <p:notesMasterId r:id="rId34"/>
   </p:notesMasterIdLst>
   <p:sldIdLst>
     <p:sldId id="256" r:id="rId2"/>
-    <p:sldId id="283" r:id="rId3"/>
-    <p:sldId id="259" r:id="rId4"/>
-    <p:sldId id="284" r:id="rId5"/>
-    <p:sldId id="257" r:id="rId6"/>
-    <p:sldId id="258" r:id="rId7"/>
-    <p:sldId id="260" r:id="rId8"/>
-    <p:sldId id="261" r:id="rId9"/>
-    <p:sldId id="262" r:id="rId10"/>
-    <p:sldId id="263" r:id="rId11"/>
-    <p:sldId id="264" r:id="rId12"/>
-    <p:sldId id="265" r:id="rId13"/>
-    <p:sldId id="280" r:id="rId14"/>
-    <p:sldId id="279" r:id="rId15"/>
-    <p:sldId id="273" r:id="rId16"/>
-    <p:sldId id="288" r:id="rId17"/>
-    <p:sldId id="274" r:id="rId18"/>
-    <p:sldId id="275" r:id="rId19"/>
-    <p:sldId id="277" r:id="rId20"/>
-    <p:sldId id="276" r:id="rId21"/>
-    <p:sldId id="289" r:id="rId22"/>
-    <p:sldId id="287" r:id="rId23"/>
-    <p:sldId id="278" r:id="rId24"/>
-    <p:sldId id="286" r:id="rId25"/>
-    <p:sldId id="269" r:id="rId26"/>
-    <p:sldId id="285" r:id="rId27"/>
-    <p:sldId id="270" r:id="rId28"/>
-    <p:sldId id="281" r:id="rId29"/>
-    <p:sldId id="282" r:id="rId30"/>
-    <p:sldId id="271" r:id="rId31"/>
-    <p:sldId id="272" r:id="rId32"/>
+    <p:sldId id="290" r:id="rId3"/>
+    <p:sldId id="283" r:id="rId4"/>
+    <p:sldId id="259" r:id="rId5"/>
+    <p:sldId id="284" r:id="rId6"/>
+    <p:sldId id="257" r:id="rId7"/>
+    <p:sldId id="258" r:id="rId8"/>
+    <p:sldId id="260" r:id="rId9"/>
+    <p:sldId id="261" r:id="rId10"/>
+    <p:sldId id="262" r:id="rId11"/>
+    <p:sldId id="263" r:id="rId12"/>
+    <p:sldId id="264" r:id="rId13"/>
+    <p:sldId id="265" r:id="rId14"/>
+    <p:sldId id="280" r:id="rId15"/>
+    <p:sldId id="279" r:id="rId16"/>
+    <p:sldId id="273" r:id="rId17"/>
+    <p:sldId id="288" r:id="rId18"/>
+    <p:sldId id="274" r:id="rId19"/>
+    <p:sldId id="275" r:id="rId20"/>
+    <p:sldId id="277" r:id="rId21"/>
+    <p:sldId id="276" r:id="rId22"/>
+    <p:sldId id="289" r:id="rId23"/>
+    <p:sldId id="287" r:id="rId24"/>
+    <p:sldId id="278" r:id="rId25"/>
+    <p:sldId id="286" r:id="rId26"/>
+    <p:sldId id="269" r:id="rId27"/>
+    <p:sldId id="285" r:id="rId28"/>
+    <p:sldId id="270" r:id="rId29"/>
+    <p:sldId id="281" r:id="rId30"/>
+    <p:sldId id="282" r:id="rId31"/>
+    <p:sldId id="271" r:id="rId32"/>
+    <p:sldId id="272" r:id="rId33"/>
   </p:sldIdLst>
   <p:sldSz cx="12192000" cy="6858000"/>
   <p:notesSz cx="6858000" cy="9144000"/>
@@ -559,7 +560,7 @@
           <a:p>
             <a:fld id="{3A99376B-ADBF-4BED-A802-ABAD07EED65B}" type="slidenum">
               <a:rPr lang="en-US" smtClean="0"/>
-              <a:t>5</a:t>
+              <a:t>6</a:t>
             </a:fld>
             <a:endParaRPr lang="en-US"/>
           </a:p>
@@ -740,7 +741,7 @@
           <a:p>
             <a:fld id="{3A99376B-ADBF-4BED-A802-ABAD07EED65B}" type="slidenum">
               <a:rPr lang="en-US" smtClean="0"/>
-              <a:t>11</a:t>
+              <a:t>12</a:t>
             </a:fld>
             <a:endParaRPr lang="en-US"/>
           </a:p>
@@ -855,7 +856,7 @@
           <a:p>
             <a:fld id="{3A99376B-ADBF-4BED-A802-ABAD07EED65B}" type="slidenum">
               <a:rPr lang="en-US" smtClean="0"/>
-              <a:t>14</a:t>
+              <a:t>15</a:t>
             </a:fld>
             <a:endParaRPr lang="en-US"/>
           </a:p>
@@ -946,7 +947,7 @@
           <a:p>
             <a:fld id="{3A99376B-ADBF-4BED-A802-ABAD07EED65B}" type="slidenum">
               <a:rPr lang="en-US" smtClean="0"/>
-              <a:t>17</a:t>
+              <a:t>18</a:t>
             </a:fld>
             <a:endParaRPr lang="en-US"/>
           </a:p>
@@ -1040,7 +1041,7 @@
           <a:p>
             <a:fld id="{3A99376B-ADBF-4BED-A802-ABAD07EED65B}" type="slidenum">
               <a:rPr lang="en-US" smtClean="0"/>
-              <a:t>18</a:t>
+              <a:t>19</a:t>
             </a:fld>
             <a:endParaRPr lang="en-US"/>
           </a:p>
@@ -1139,7 +1140,7 @@
           <a:p>
             <a:fld id="{3A99376B-ADBF-4BED-A802-ABAD07EED65B}" type="slidenum">
               <a:rPr lang="en-US" smtClean="0"/>
-              <a:t>27</a:t>
+              <a:t>28</a:t>
             </a:fld>
             <a:endParaRPr lang="en-US"/>
           </a:p>
@@ -1232,7 +1233,7 @@
           <a:p>
             <a:fld id="{3A99376B-ADBF-4BED-A802-ABAD07EED65B}" type="slidenum">
               <a:rPr lang="en-US" smtClean="0"/>
-              <a:t>29</a:t>
+              <a:t>30</a:t>
             </a:fld>
             <a:endParaRPr lang="en-US"/>
           </a:p>
@@ -4217,6 +4218,96 @@
           <p:cNvPr id="2" name="Title 1">
             <a:extLst>
               <a:ext uri="{FF2B5EF4-FFF2-40B4-BE49-F238E27FC236}">
+                <a16:creationId xmlns:a16="http://schemas.microsoft.com/office/drawing/2014/main" id="{BB9F5CB4-761A-0CFA-6810-F801DAB87CFE}"/>
+              </a:ext>
+            </a:extLst>
+          </p:cNvPr>
+          <p:cNvSpPr>
+            <a:spLocks noGrp="1"/>
+          </p:cNvSpPr>
+          <p:nvPr>
+            <p:ph type="title"/>
+          </p:nvPr>
+        </p:nvSpPr>
+        <p:spPr/>
+        <p:txBody>
+          <a:bodyPr/>
+          <a:lstStyle/>
+          <a:p>
+            <a:r>
+              <a:rPr lang="en-US" dirty="0"/>
+              <a:t>Dollar Index (DXY)</a:t>
+            </a:r>
+          </a:p>
+        </p:txBody>
+      </p:sp>
+      <p:pic>
+        <p:nvPicPr>
+          <p:cNvPr id="5" name="Content Placeholder 4">
+            <a:extLst>
+              <a:ext uri="{FF2B5EF4-FFF2-40B4-BE49-F238E27FC236}">
+                <a16:creationId xmlns:a16="http://schemas.microsoft.com/office/drawing/2014/main" id="{269C7277-0160-3C52-0BF7-3D48BF5288E0}"/>
+              </a:ext>
+            </a:extLst>
+          </p:cNvPr>
+          <p:cNvPicPr>
+            <a:picLocks noGrp="1" noChangeAspect="1"/>
+          </p:cNvPicPr>
+          <p:nvPr>
+            <p:ph idx="1"/>
+          </p:nvPr>
+        </p:nvPicPr>
+        <p:blipFill>
+          <a:blip r:embed="rId2"/>
+          <a:stretch>
+            <a:fillRect/>
+          </a:stretch>
+        </p:blipFill>
+        <p:spPr>
+          <a:xfrm>
+            <a:off x="2493406" y="1825625"/>
+            <a:ext cx="7205188" cy="4351338"/>
+          </a:xfrm>
+          <a:prstGeom prst="rect">
+            <a:avLst/>
+          </a:prstGeom>
+        </p:spPr>
+      </p:pic>
+    </p:spTree>
+    <p:extLst>
+      <p:ext uri="{BB962C8B-B14F-4D97-AF65-F5344CB8AC3E}">
+        <p14:creationId xmlns:p14="http://schemas.microsoft.com/office/powerpoint/2010/main" val="403296574"/>
+      </p:ext>
+    </p:extLst>
+  </p:cSld>
+  <p:clrMapOvr>
+    <a:masterClrMapping/>
+  </p:clrMapOvr>
+</p:sld>
+</file>
+
+<file path=ppt/slides/slide11.xml><?xml version="1.0" encoding="utf-8"?>
+<p:sld xmlns:a="http://schemas.openxmlformats.org/drawingml/2006/main" xmlns:r="http://schemas.openxmlformats.org/officeDocument/2006/relationships" xmlns:p="http://schemas.openxmlformats.org/presentationml/2006/main">
+  <p:cSld>
+    <p:spTree>
+      <p:nvGrpSpPr>
+        <p:cNvPr id="1" name=""/>
+        <p:cNvGrpSpPr/>
+        <p:nvPr/>
+      </p:nvGrpSpPr>
+      <p:grpSpPr>
+        <a:xfrm>
+          <a:off x="0" y="0"/>
+          <a:ext cx="0" cy="0"/>
+          <a:chOff x="0" y="0"/>
+          <a:chExt cx="0" cy="0"/>
+        </a:xfrm>
+      </p:grpSpPr>
+      <p:sp>
+        <p:nvSpPr>
+          <p:cNvPr id="2" name="Title 1">
+            <a:extLst>
+              <a:ext uri="{FF2B5EF4-FFF2-40B4-BE49-F238E27FC236}">
                 <a16:creationId xmlns:a16="http://schemas.microsoft.com/office/drawing/2014/main" id="{6BC4E5D5-285B-BF73-C9EB-89A5A26AAE92}"/>
               </a:ext>
             </a:extLst>
@@ -4317,7 +4408,7 @@
 </p:sld>
 </file>
 
-<file path=ppt/slides/slide11.xml><?xml version="1.0" encoding="utf-8"?>
+<file path=ppt/slides/slide12.xml><?xml version="1.0" encoding="utf-8"?>
 <p:sld xmlns:a="http://schemas.openxmlformats.org/drawingml/2006/main" xmlns:r="http://schemas.openxmlformats.org/officeDocument/2006/relationships" xmlns:p="http://schemas.openxmlformats.org/presentationml/2006/main">
   <p:cSld>
     <p:spTree>
@@ -4407,89 +4498,6 @@
 </p:sld>
 </file>
 
-<file path=ppt/slides/slide12.xml><?xml version="1.0" encoding="utf-8"?>
-<p:sld xmlns:a="http://schemas.openxmlformats.org/drawingml/2006/main" xmlns:r="http://schemas.openxmlformats.org/officeDocument/2006/relationships" xmlns:p="http://schemas.openxmlformats.org/presentationml/2006/main">
-  <p:cSld>
-    <p:spTree>
-      <p:nvGrpSpPr>
-        <p:cNvPr id="1" name=""/>
-        <p:cNvGrpSpPr/>
-        <p:nvPr/>
-      </p:nvGrpSpPr>
-      <p:grpSpPr>
-        <a:xfrm>
-          <a:off x="0" y="0"/>
-          <a:ext cx="0" cy="0"/>
-          <a:chOff x="0" y="0"/>
-          <a:chExt cx="0" cy="0"/>
-        </a:xfrm>
-      </p:grpSpPr>
-      <p:sp>
-        <p:nvSpPr>
-          <p:cNvPr id="4" name="Title 3">
-            <a:extLst>
-              <a:ext uri="{FF2B5EF4-FFF2-40B4-BE49-F238E27FC236}">
-                <a16:creationId xmlns:a16="http://schemas.microsoft.com/office/drawing/2014/main" id="{EEC66F14-1159-A4C7-BF27-3956C76B429A}"/>
-              </a:ext>
-            </a:extLst>
-          </p:cNvPr>
-          <p:cNvSpPr>
-            <a:spLocks noGrp="1"/>
-          </p:cNvSpPr>
-          <p:nvPr>
-            <p:ph type="title"/>
-          </p:nvPr>
-        </p:nvSpPr>
-        <p:spPr/>
-        <p:txBody>
-          <a:bodyPr/>
-          <a:lstStyle/>
-          <a:p>
-            <a:r>
-              <a:rPr lang="en-US" dirty="0"/>
-              <a:t>Global Economy</a:t>
-            </a:r>
-          </a:p>
-        </p:txBody>
-      </p:sp>
-      <p:sp>
-        <p:nvSpPr>
-          <p:cNvPr id="5" name="Text Placeholder 4">
-            <a:extLst>
-              <a:ext uri="{FF2B5EF4-FFF2-40B4-BE49-F238E27FC236}">
-                <a16:creationId xmlns:a16="http://schemas.microsoft.com/office/drawing/2014/main" id="{7BB505BA-23C5-4351-C416-4482B74C6CBB}"/>
-              </a:ext>
-            </a:extLst>
-          </p:cNvPr>
-          <p:cNvSpPr>
-            <a:spLocks noGrp="1"/>
-          </p:cNvSpPr>
-          <p:nvPr>
-            <p:ph type="body" idx="1"/>
-          </p:nvPr>
-        </p:nvSpPr>
-        <p:spPr/>
-        <p:txBody>
-          <a:bodyPr/>
-          <a:lstStyle/>
-          <a:p>
-            <a:endParaRPr lang="en-US"/>
-          </a:p>
-        </p:txBody>
-      </p:sp>
-    </p:spTree>
-    <p:extLst>
-      <p:ext uri="{BB962C8B-B14F-4D97-AF65-F5344CB8AC3E}">
-        <p14:creationId xmlns:p14="http://schemas.microsoft.com/office/powerpoint/2010/main" val="814161276"/>
-      </p:ext>
-    </p:extLst>
-  </p:cSld>
-  <p:clrMapOvr>
-    <a:masterClrMapping/>
-  </p:clrMapOvr>
-</p:sld>
-</file>
-
 <file path=ppt/slides/slide13.xml><?xml version="1.0" encoding="utf-8"?>
 <p:sld xmlns:a="http://schemas.openxmlformats.org/drawingml/2006/main" xmlns:r="http://schemas.openxmlformats.org/officeDocument/2006/relationships" xmlns:p="http://schemas.openxmlformats.org/presentationml/2006/main">
   <p:cSld>
@@ -4512,6 +4520,89 @@
           <p:cNvPr id="4" name="Title 3">
             <a:extLst>
               <a:ext uri="{FF2B5EF4-FFF2-40B4-BE49-F238E27FC236}">
+                <a16:creationId xmlns:a16="http://schemas.microsoft.com/office/drawing/2014/main" id="{EEC66F14-1159-A4C7-BF27-3956C76B429A}"/>
+              </a:ext>
+            </a:extLst>
+          </p:cNvPr>
+          <p:cNvSpPr>
+            <a:spLocks noGrp="1"/>
+          </p:cNvSpPr>
+          <p:nvPr>
+            <p:ph type="title"/>
+          </p:nvPr>
+        </p:nvSpPr>
+        <p:spPr/>
+        <p:txBody>
+          <a:bodyPr/>
+          <a:lstStyle/>
+          <a:p>
+            <a:r>
+              <a:rPr lang="en-US" dirty="0"/>
+              <a:t>3. Global Economy</a:t>
+            </a:r>
+          </a:p>
+        </p:txBody>
+      </p:sp>
+      <p:sp>
+        <p:nvSpPr>
+          <p:cNvPr id="5" name="Text Placeholder 4">
+            <a:extLst>
+              <a:ext uri="{FF2B5EF4-FFF2-40B4-BE49-F238E27FC236}">
+                <a16:creationId xmlns:a16="http://schemas.microsoft.com/office/drawing/2014/main" id="{7BB505BA-23C5-4351-C416-4482B74C6CBB}"/>
+              </a:ext>
+            </a:extLst>
+          </p:cNvPr>
+          <p:cNvSpPr>
+            <a:spLocks noGrp="1"/>
+          </p:cNvSpPr>
+          <p:nvPr>
+            <p:ph type="body" idx="1"/>
+          </p:nvPr>
+        </p:nvSpPr>
+        <p:spPr/>
+        <p:txBody>
+          <a:bodyPr/>
+          <a:lstStyle/>
+          <a:p>
+            <a:endParaRPr lang="en-US"/>
+          </a:p>
+        </p:txBody>
+      </p:sp>
+    </p:spTree>
+    <p:extLst>
+      <p:ext uri="{BB962C8B-B14F-4D97-AF65-F5344CB8AC3E}">
+        <p14:creationId xmlns:p14="http://schemas.microsoft.com/office/powerpoint/2010/main" val="814161276"/>
+      </p:ext>
+    </p:extLst>
+  </p:cSld>
+  <p:clrMapOvr>
+    <a:masterClrMapping/>
+  </p:clrMapOvr>
+</p:sld>
+</file>
+
+<file path=ppt/slides/slide14.xml><?xml version="1.0" encoding="utf-8"?>
+<p:sld xmlns:a="http://schemas.openxmlformats.org/drawingml/2006/main" xmlns:r="http://schemas.openxmlformats.org/officeDocument/2006/relationships" xmlns:p="http://schemas.openxmlformats.org/presentationml/2006/main">
+  <p:cSld>
+    <p:spTree>
+      <p:nvGrpSpPr>
+        <p:cNvPr id="1" name=""/>
+        <p:cNvGrpSpPr/>
+        <p:nvPr/>
+      </p:nvGrpSpPr>
+      <p:grpSpPr>
+        <a:xfrm>
+          <a:off x="0" y="0"/>
+          <a:ext cx="0" cy="0"/>
+          <a:chOff x="0" y="0"/>
+          <a:chExt cx="0" cy="0"/>
+        </a:xfrm>
+      </p:grpSpPr>
+      <p:sp>
+        <p:nvSpPr>
+          <p:cNvPr id="4" name="Title 3">
+            <a:extLst>
+              <a:ext uri="{FF2B5EF4-FFF2-40B4-BE49-F238E27FC236}">
                 <a16:creationId xmlns:a16="http://schemas.microsoft.com/office/drawing/2014/main" id="{9FB5C929-75BC-5937-28E4-E5E15193C995}"/>
               </a:ext>
             </a:extLst>
@@ -4712,7 +4803,7 @@
 </p:sld>
 </file>
 
-<file path=ppt/slides/slide14.xml><?xml version="1.0" encoding="utf-8"?>
+<file path=ppt/slides/slide15.xml><?xml version="1.0" encoding="utf-8"?>
 <p:sld xmlns:a="http://schemas.openxmlformats.org/drawingml/2006/main" xmlns:r="http://schemas.openxmlformats.org/officeDocument/2006/relationships" xmlns:p="http://schemas.openxmlformats.org/presentationml/2006/main">
   <p:cSld>
     <p:spTree>
@@ -4883,7 +4974,7 @@
 </p:sld>
 </file>
 
-<file path=ppt/slides/slide15.xml><?xml version="1.0" encoding="utf-8"?>
+<file path=ppt/slides/slide16.xml><?xml version="1.0" encoding="utf-8"?>
 <p:sld xmlns:a="http://schemas.openxmlformats.org/drawingml/2006/main" xmlns:r="http://schemas.openxmlformats.org/officeDocument/2006/relationships" xmlns:p="http://schemas.openxmlformats.org/presentationml/2006/main">
   <p:cSld>
     <p:spTree>
@@ -4923,7 +5014,7 @@
           <a:p>
             <a:r>
               <a:rPr lang="en-US" dirty="0"/>
-              <a:t>Crude Oil</a:t>
+              <a:t>4. Crude Oil</a:t>
             </a:r>
           </a:p>
         </p:txBody>
@@ -4966,7 +5057,7 @@
 </p:sld>
 </file>
 
-<file path=ppt/slides/slide16.xml><?xml version="1.0" encoding="utf-8"?>
+<file path=ppt/slides/slide17.xml><?xml version="1.0" encoding="utf-8"?>
 <p:sld xmlns:a="http://schemas.openxmlformats.org/drawingml/2006/main" xmlns:r="http://schemas.openxmlformats.org/officeDocument/2006/relationships" xmlns:p="http://schemas.openxmlformats.org/presentationml/2006/main">
   <p:cSld>
     <p:spTree>
@@ -5056,7 +5147,7 @@
 </p:sld>
 </file>
 
-<file path=ppt/slides/slide17.xml><?xml version="1.0" encoding="utf-8"?>
+<file path=ppt/slides/slide18.xml><?xml version="1.0" encoding="utf-8"?>
 <p:sld xmlns:a="http://schemas.openxmlformats.org/drawingml/2006/main" xmlns:r="http://schemas.openxmlformats.org/officeDocument/2006/relationships" xmlns:p="http://schemas.openxmlformats.org/presentationml/2006/main">
   <p:cSld>
     <p:spTree>
@@ -5221,7 +5312,7 @@
 </p:sld>
 </file>
 
-<file path=ppt/slides/slide18.xml><?xml version="1.0" encoding="utf-8"?>
+<file path=ppt/slides/slide19.xml><?xml version="1.0" encoding="utf-8"?>
 <p:sld xmlns:a="http://schemas.openxmlformats.org/drawingml/2006/main" xmlns:r="http://schemas.openxmlformats.org/officeDocument/2006/relationships" xmlns:p="http://schemas.openxmlformats.org/presentationml/2006/main">
   <p:cSld>
     <p:spTree>
@@ -5345,215 +5436,6 @@
     <p:extLst>
       <p:ext uri="{BB962C8B-B14F-4D97-AF65-F5344CB8AC3E}">
         <p14:creationId xmlns:p14="http://schemas.microsoft.com/office/powerpoint/2010/main" val="1737193659"/>
-      </p:ext>
-    </p:extLst>
-  </p:cSld>
-  <p:clrMapOvr>
-    <a:masterClrMapping/>
-  </p:clrMapOvr>
-</p:sld>
-</file>
-
-<file path=ppt/slides/slide19.xml><?xml version="1.0" encoding="utf-8"?>
-<p:sld xmlns:a="http://schemas.openxmlformats.org/drawingml/2006/main" xmlns:r="http://schemas.openxmlformats.org/officeDocument/2006/relationships" xmlns:p="http://schemas.openxmlformats.org/presentationml/2006/main">
-  <p:cSld>
-    <p:spTree>
-      <p:nvGrpSpPr>
-        <p:cNvPr id="1" name=""/>
-        <p:cNvGrpSpPr/>
-        <p:nvPr/>
-      </p:nvGrpSpPr>
-      <p:grpSpPr>
-        <a:xfrm>
-          <a:off x="0" y="0"/>
-          <a:ext cx="0" cy="0"/>
-          <a:chOff x="0" y="0"/>
-          <a:chExt cx="0" cy="0"/>
-        </a:xfrm>
-      </p:grpSpPr>
-      <p:sp>
-        <p:nvSpPr>
-          <p:cNvPr id="4" name="Title 3">
-            <a:extLst>
-              <a:ext uri="{FF2B5EF4-FFF2-40B4-BE49-F238E27FC236}">
-                <a16:creationId xmlns:a16="http://schemas.microsoft.com/office/drawing/2014/main" id="{BEF7BD5C-F9CE-9977-ABC9-A2BF5F4E1EAE}"/>
-              </a:ext>
-            </a:extLst>
-          </p:cNvPr>
-          <p:cNvSpPr>
-            <a:spLocks noGrp="1"/>
-          </p:cNvSpPr>
-          <p:nvPr>
-            <p:ph type="title"/>
-          </p:nvPr>
-        </p:nvSpPr>
-        <p:spPr/>
-        <p:txBody>
-          <a:bodyPr/>
-          <a:lstStyle/>
-          <a:p>
-            <a:r>
-              <a:rPr lang="en-US" dirty="0"/>
-              <a:t>Bearish Oil Outlook for 2025-2026</a:t>
-            </a:r>
-          </a:p>
-        </p:txBody>
-      </p:sp>
-      <p:sp>
-        <p:nvSpPr>
-          <p:cNvPr id="5" name="Content Placeholder 4">
-            <a:extLst>
-              <a:ext uri="{FF2B5EF4-FFF2-40B4-BE49-F238E27FC236}">
-                <a16:creationId xmlns:a16="http://schemas.microsoft.com/office/drawing/2014/main" id="{F87A2C41-CE1F-AB73-738B-3E15C2452502}"/>
-              </a:ext>
-            </a:extLst>
-          </p:cNvPr>
-          <p:cNvSpPr>
-            <a:spLocks noGrp="1"/>
-          </p:cNvSpPr>
-          <p:nvPr>
-            <p:ph sz="half" idx="1"/>
-          </p:nvPr>
-        </p:nvSpPr>
-        <p:spPr>
-          <a:xfrm>
-            <a:off x="838200" y="1825625"/>
-            <a:ext cx="4306455" cy="4351338"/>
-          </a:xfrm>
-        </p:spPr>
-        <p:txBody>
-          <a:bodyPr>
-            <a:normAutofit fontScale="77500" lnSpcReduction="20000"/>
-          </a:bodyPr>
-          <a:lstStyle/>
-          <a:p>
-            <a:r>
-              <a:rPr lang="en-US" dirty="0"/>
-              <a:t>J.P. Morgan’s base case for oil remains anchored by the supply-demand balance. Since February, </a:t>
-            </a:r>
-            <a:r>
-              <a:rPr lang="en-US" b="1" dirty="0"/>
-              <a:t>global oil inventories</a:t>
-            </a:r>
-            <a:r>
-              <a:rPr lang="en-US" dirty="0"/>
-              <a:t> have </a:t>
-            </a:r>
-            <a:r>
-              <a:rPr lang="en-US" b="1" dirty="0"/>
-              <a:t>increased</a:t>
-            </a:r>
-            <a:r>
-              <a:rPr lang="en-US" dirty="0"/>
-              <a:t> by almost 240 million barrels, indicating that supply is abundant. </a:t>
-            </a:r>
-          </a:p>
-          <a:p>
-            <a:r>
-              <a:rPr lang="en-US" dirty="0"/>
-              <a:t>Based on our forward physical oil balances, which show a market in a 2.2–2.4 mbd surplus over the second half of 2025, oil is anticipated to trade in the low- to mid-$60/bbl range for the remainder of 2025 and settle at </a:t>
-            </a:r>
-            <a:r>
-              <a:rPr lang="en-US" b="1" dirty="0"/>
-              <a:t>$60/bbl </a:t>
-            </a:r>
-            <a:r>
-              <a:rPr lang="en-US" dirty="0"/>
-              <a:t>in </a:t>
-            </a:r>
-            <a:r>
-              <a:rPr lang="en-US" b="1" dirty="0"/>
-              <a:t>2026</a:t>
-            </a:r>
-            <a:r>
-              <a:rPr lang="en-US" dirty="0"/>
-              <a:t>.</a:t>
-            </a:r>
-          </a:p>
-          <a:p>
-            <a:endParaRPr lang="en-US" dirty="0"/>
-          </a:p>
-        </p:txBody>
-      </p:sp>
-      <p:pic>
-        <p:nvPicPr>
-          <p:cNvPr id="8" name="Content Placeholder 7">
-            <a:extLst>
-              <a:ext uri="{FF2B5EF4-FFF2-40B4-BE49-F238E27FC236}">
-                <a16:creationId xmlns:a16="http://schemas.microsoft.com/office/drawing/2014/main" id="{A429C3CD-A829-AC32-7852-5A826168A66B}"/>
-              </a:ext>
-            </a:extLst>
-          </p:cNvPr>
-          <p:cNvPicPr>
-            <a:picLocks noGrp="1" noChangeAspect="1"/>
-          </p:cNvPicPr>
-          <p:nvPr>
-            <p:ph sz="half" idx="2"/>
-          </p:nvPr>
-        </p:nvPicPr>
-        <p:blipFill>
-          <a:blip r:embed="rId2"/>
-          <a:stretch>
-            <a:fillRect/>
-          </a:stretch>
-        </p:blipFill>
-        <p:spPr>
-          <a:xfrm>
-            <a:off x="5737161" y="1882085"/>
-            <a:ext cx="5616639" cy="4213915"/>
-          </a:xfrm>
-          <a:prstGeom prst="rect">
-            <a:avLst/>
-          </a:prstGeom>
-        </p:spPr>
-      </p:pic>
-      <p:sp>
-        <p:nvSpPr>
-          <p:cNvPr id="9" name="TextBox 8">
-            <a:extLst>
-              <a:ext uri="{FF2B5EF4-FFF2-40B4-BE49-F238E27FC236}">
-                <a16:creationId xmlns:a16="http://schemas.microsoft.com/office/drawing/2014/main" id="{1FD5CF44-CDE2-8807-1CBD-C66E93B6BEFD}"/>
-              </a:ext>
-            </a:extLst>
-          </p:cNvPr>
-          <p:cNvSpPr txBox="1"/>
-          <p:nvPr/>
-        </p:nvSpPr>
-        <p:spPr>
-          <a:xfrm>
-            <a:off x="0" y="6492875"/>
-            <a:ext cx="12192000" cy="369332"/>
-          </a:xfrm>
-          <a:prstGeom prst="rect">
-            <a:avLst/>
-          </a:prstGeom>
-          <a:noFill/>
-        </p:spPr>
-        <p:txBody>
-          <a:bodyPr wrap="square" rtlCol="0">
-            <a:spAutoFit/>
-          </a:bodyPr>
-          <a:lstStyle/>
-          <a:p>
-            <a:pPr algn="ctr"/>
-            <a:r>
-              <a:rPr lang="en-US" dirty="0"/>
-              <a:t>Reference: </a:t>
-            </a:r>
-            <a:r>
-              <a:rPr lang="en-US" dirty="0">
-                <a:hlinkClick r:id="rId3"/>
-              </a:rPr>
-              <a:t> J.P. Morgan Research, Mid-year market outlook 2025</a:t>
-            </a:r>
-            <a:endParaRPr lang="x-none" dirty="0"/>
-          </a:p>
-        </p:txBody>
-      </p:sp>
-    </p:spTree>
-    <p:extLst>
-      <p:ext uri="{BB962C8B-B14F-4D97-AF65-F5344CB8AC3E}">
-        <p14:creationId xmlns:p14="http://schemas.microsoft.com/office/powerpoint/2010/main" val="3952441491"/>
       </p:ext>
     </p:extLst>
   </p:cSld>
@@ -5582,10 +5464,10 @@
       </p:grpSpPr>
       <p:sp>
         <p:nvSpPr>
-          <p:cNvPr id="2" name="Title 1">
+          <p:cNvPr id="4" name="Title 3">
             <a:extLst>
               <a:ext uri="{FF2B5EF4-FFF2-40B4-BE49-F238E27FC236}">
-                <a16:creationId xmlns:a16="http://schemas.microsoft.com/office/drawing/2014/main" id="{F92F6E53-B2B1-974C-A528-A2F8857ACD21}"/>
+                <a16:creationId xmlns:a16="http://schemas.microsoft.com/office/drawing/2014/main" id="{D09379F5-9A77-516D-110C-0E175E48E16E}"/>
               </a:ext>
             </a:extLst>
           </p:cNvPr>
@@ -5602,19 +5484,18 @@
           <a:lstStyle/>
           <a:p>
             <a:r>
-              <a:rPr lang="en-US"/>
-              <a:t>Forecasting Approaches</a:t>
-            </a:r>
-            <a:endParaRPr lang="en-US" dirty="0"/>
-          </a:p>
-        </p:txBody>
-      </p:sp>
-      <p:sp>
-        <p:nvSpPr>
-          <p:cNvPr id="3" name="Content Placeholder 2">
+              <a:rPr lang="en-US" dirty="0"/>
+              <a:t>1. Introduction</a:t>
+            </a:r>
+          </a:p>
+        </p:txBody>
+      </p:sp>
+      <p:sp>
+        <p:nvSpPr>
+          <p:cNvPr id="5" name="Text Placeholder 4">
             <a:extLst>
               <a:ext uri="{FF2B5EF4-FFF2-40B4-BE49-F238E27FC236}">
-                <a16:creationId xmlns:a16="http://schemas.microsoft.com/office/drawing/2014/main" id="{1D6CF543-3291-DE2F-9FF9-97DBD4DD59C8}"/>
+                <a16:creationId xmlns:a16="http://schemas.microsoft.com/office/drawing/2014/main" id="{F4AF0842-1635-2351-B601-E10182F29822}"/>
               </a:ext>
             </a:extLst>
           </p:cNvPr>
@@ -5622,78 +5503,22 @@
             <a:spLocks noGrp="1"/>
           </p:cNvSpPr>
           <p:nvPr>
-            <p:ph idx="1"/>
-          </p:nvPr>
-        </p:nvSpPr>
-        <p:spPr/>
-        <p:txBody>
-          <a:bodyPr/>
-          <a:lstStyle/>
-          <a:p>
-            <a:pPr marL="514350" indent="-514350">
-              <a:buFont typeface="+mj-lt"/>
-              <a:buAutoNum type="arabicPeriod"/>
-            </a:pPr>
-            <a:r>
-              <a:rPr lang="en-US" b="1" dirty="0"/>
-              <a:t>Technical Analysis</a:t>
-            </a:r>
-            <a:r>
-              <a:rPr lang="en-US" dirty="0"/>
-              <a:t>: Discretionary price and volume analysis</a:t>
-            </a:r>
-          </a:p>
-          <a:p>
-            <a:pPr marL="514350" indent="-514350">
-              <a:buFont typeface="+mj-lt"/>
-              <a:buAutoNum type="arabicPeriod"/>
-            </a:pPr>
-            <a:r>
-              <a:rPr lang="en-US" b="1" dirty="0"/>
-              <a:t>Quantitative Analysis</a:t>
-            </a:r>
-            <a:r>
-              <a:rPr lang="en-US" dirty="0"/>
-              <a:t>: Applying statistics and machine learning</a:t>
-            </a:r>
-          </a:p>
-          <a:p>
-            <a:pPr marL="514350" indent="-514350">
-              <a:buFont typeface="+mj-lt"/>
-              <a:buAutoNum type="arabicPeriod"/>
-            </a:pPr>
-            <a:r>
-              <a:rPr lang="en-US" b="1" dirty="0"/>
-              <a:t>Sentiment Analysis</a:t>
-            </a:r>
-            <a:r>
-              <a:rPr lang="en-US" dirty="0"/>
-              <a:t>: General sentiment of market participants</a:t>
-            </a:r>
-          </a:p>
-          <a:p>
-            <a:pPr marL="514350" indent="-514350">
-              <a:buFont typeface="+mj-lt"/>
-              <a:buAutoNum type="arabicPeriod"/>
-            </a:pPr>
-            <a:r>
-              <a:rPr lang="en-US" b="1" dirty="0"/>
-              <a:t>Fundamental Analysis</a:t>
-            </a:r>
-            <a:r>
-              <a:rPr lang="en-US" dirty="0"/>
-              <a:t>: Economics and finance theories on value, equilibrium levels, and supply and demand</a:t>
-            </a:r>
-          </a:p>
-          <a:p>
-            <a:endParaRPr lang="en-US" dirty="0"/>
+            <p:ph type="body" idx="1"/>
+          </p:nvPr>
+        </p:nvSpPr>
+        <p:spPr/>
+        <p:txBody>
+          <a:bodyPr/>
+          <a:lstStyle/>
+          <a:p>
+            <a:endParaRPr lang="en-US"/>
           </a:p>
         </p:txBody>
       </p:sp>
     </p:spTree>
     <p:extLst>
       <p:ext uri="{BB962C8B-B14F-4D97-AF65-F5344CB8AC3E}">
-        <p14:creationId xmlns:p14="http://schemas.microsoft.com/office/powerpoint/2010/main" val="2647621218"/>
+        <p14:creationId xmlns:p14="http://schemas.microsoft.com/office/powerpoint/2010/main" val="358444850"/>
       </p:ext>
     </p:extLst>
   </p:cSld>
@@ -5704,6 +5529,215 @@
 </file>
 
 <file path=ppt/slides/slide20.xml><?xml version="1.0" encoding="utf-8"?>
+<p:sld xmlns:a="http://schemas.openxmlformats.org/drawingml/2006/main" xmlns:r="http://schemas.openxmlformats.org/officeDocument/2006/relationships" xmlns:p="http://schemas.openxmlformats.org/presentationml/2006/main">
+  <p:cSld>
+    <p:spTree>
+      <p:nvGrpSpPr>
+        <p:cNvPr id="1" name=""/>
+        <p:cNvGrpSpPr/>
+        <p:nvPr/>
+      </p:nvGrpSpPr>
+      <p:grpSpPr>
+        <a:xfrm>
+          <a:off x="0" y="0"/>
+          <a:ext cx="0" cy="0"/>
+          <a:chOff x="0" y="0"/>
+          <a:chExt cx="0" cy="0"/>
+        </a:xfrm>
+      </p:grpSpPr>
+      <p:sp>
+        <p:nvSpPr>
+          <p:cNvPr id="4" name="Title 3">
+            <a:extLst>
+              <a:ext uri="{FF2B5EF4-FFF2-40B4-BE49-F238E27FC236}">
+                <a16:creationId xmlns:a16="http://schemas.microsoft.com/office/drawing/2014/main" id="{BEF7BD5C-F9CE-9977-ABC9-A2BF5F4E1EAE}"/>
+              </a:ext>
+            </a:extLst>
+          </p:cNvPr>
+          <p:cNvSpPr>
+            <a:spLocks noGrp="1"/>
+          </p:cNvSpPr>
+          <p:nvPr>
+            <p:ph type="title"/>
+          </p:nvPr>
+        </p:nvSpPr>
+        <p:spPr/>
+        <p:txBody>
+          <a:bodyPr/>
+          <a:lstStyle/>
+          <a:p>
+            <a:r>
+              <a:rPr lang="en-US" dirty="0"/>
+              <a:t>Bearish Oil Outlook for 2025-2026</a:t>
+            </a:r>
+          </a:p>
+        </p:txBody>
+      </p:sp>
+      <p:sp>
+        <p:nvSpPr>
+          <p:cNvPr id="5" name="Content Placeholder 4">
+            <a:extLst>
+              <a:ext uri="{FF2B5EF4-FFF2-40B4-BE49-F238E27FC236}">
+                <a16:creationId xmlns:a16="http://schemas.microsoft.com/office/drawing/2014/main" id="{F87A2C41-CE1F-AB73-738B-3E15C2452502}"/>
+              </a:ext>
+            </a:extLst>
+          </p:cNvPr>
+          <p:cNvSpPr>
+            <a:spLocks noGrp="1"/>
+          </p:cNvSpPr>
+          <p:nvPr>
+            <p:ph sz="half" idx="1"/>
+          </p:nvPr>
+        </p:nvSpPr>
+        <p:spPr>
+          <a:xfrm>
+            <a:off x="838200" y="1825625"/>
+            <a:ext cx="4306455" cy="4351338"/>
+          </a:xfrm>
+        </p:spPr>
+        <p:txBody>
+          <a:bodyPr>
+            <a:normAutofit fontScale="77500" lnSpcReduction="20000"/>
+          </a:bodyPr>
+          <a:lstStyle/>
+          <a:p>
+            <a:r>
+              <a:rPr lang="en-US" dirty="0"/>
+              <a:t>J.P. Morgan’s base case for oil remains anchored by the supply-demand balance. Since February, </a:t>
+            </a:r>
+            <a:r>
+              <a:rPr lang="en-US" b="1" dirty="0"/>
+              <a:t>global oil inventories</a:t>
+            </a:r>
+            <a:r>
+              <a:rPr lang="en-US" dirty="0"/>
+              <a:t> have </a:t>
+            </a:r>
+            <a:r>
+              <a:rPr lang="en-US" b="1" dirty="0"/>
+              <a:t>increased</a:t>
+            </a:r>
+            <a:r>
+              <a:rPr lang="en-US" dirty="0"/>
+              <a:t> by almost 240 million barrels, indicating that supply is abundant. </a:t>
+            </a:r>
+          </a:p>
+          <a:p>
+            <a:r>
+              <a:rPr lang="en-US" dirty="0"/>
+              <a:t>Based on our forward physical oil balances, which show a market in a 2.2–2.4 mbd surplus over the second half of 2025, oil is anticipated to trade in the low- to mid-$60/bbl range for the remainder of 2025 and settle at </a:t>
+            </a:r>
+            <a:r>
+              <a:rPr lang="en-US" b="1" dirty="0"/>
+              <a:t>$60/bbl </a:t>
+            </a:r>
+            <a:r>
+              <a:rPr lang="en-US" dirty="0"/>
+              <a:t>in </a:t>
+            </a:r>
+            <a:r>
+              <a:rPr lang="en-US" b="1" dirty="0"/>
+              <a:t>2026</a:t>
+            </a:r>
+            <a:r>
+              <a:rPr lang="en-US" dirty="0"/>
+              <a:t>.</a:t>
+            </a:r>
+          </a:p>
+          <a:p>
+            <a:endParaRPr lang="en-US" dirty="0"/>
+          </a:p>
+        </p:txBody>
+      </p:sp>
+      <p:pic>
+        <p:nvPicPr>
+          <p:cNvPr id="8" name="Content Placeholder 7">
+            <a:extLst>
+              <a:ext uri="{FF2B5EF4-FFF2-40B4-BE49-F238E27FC236}">
+                <a16:creationId xmlns:a16="http://schemas.microsoft.com/office/drawing/2014/main" id="{A429C3CD-A829-AC32-7852-5A826168A66B}"/>
+              </a:ext>
+            </a:extLst>
+          </p:cNvPr>
+          <p:cNvPicPr>
+            <a:picLocks noGrp="1" noChangeAspect="1"/>
+          </p:cNvPicPr>
+          <p:nvPr>
+            <p:ph sz="half" idx="2"/>
+          </p:nvPr>
+        </p:nvPicPr>
+        <p:blipFill>
+          <a:blip r:embed="rId2"/>
+          <a:stretch>
+            <a:fillRect/>
+          </a:stretch>
+        </p:blipFill>
+        <p:spPr>
+          <a:xfrm>
+            <a:off x="5737161" y="1882085"/>
+            <a:ext cx="5616639" cy="4213915"/>
+          </a:xfrm>
+          <a:prstGeom prst="rect">
+            <a:avLst/>
+          </a:prstGeom>
+        </p:spPr>
+      </p:pic>
+      <p:sp>
+        <p:nvSpPr>
+          <p:cNvPr id="9" name="TextBox 8">
+            <a:extLst>
+              <a:ext uri="{FF2B5EF4-FFF2-40B4-BE49-F238E27FC236}">
+                <a16:creationId xmlns:a16="http://schemas.microsoft.com/office/drawing/2014/main" id="{1FD5CF44-CDE2-8807-1CBD-C66E93B6BEFD}"/>
+              </a:ext>
+            </a:extLst>
+          </p:cNvPr>
+          <p:cNvSpPr txBox="1"/>
+          <p:nvPr/>
+        </p:nvSpPr>
+        <p:spPr>
+          <a:xfrm>
+            <a:off x="0" y="6492875"/>
+            <a:ext cx="12192000" cy="369332"/>
+          </a:xfrm>
+          <a:prstGeom prst="rect">
+            <a:avLst/>
+          </a:prstGeom>
+          <a:noFill/>
+        </p:spPr>
+        <p:txBody>
+          <a:bodyPr wrap="square" rtlCol="0">
+            <a:spAutoFit/>
+          </a:bodyPr>
+          <a:lstStyle/>
+          <a:p>
+            <a:pPr algn="ctr"/>
+            <a:r>
+              <a:rPr lang="en-US" dirty="0"/>
+              <a:t>Reference: </a:t>
+            </a:r>
+            <a:r>
+              <a:rPr lang="en-US" dirty="0">
+                <a:hlinkClick r:id="rId3"/>
+              </a:rPr>
+              <a:t> J.P. Morgan Research, Mid-year market outlook 2025</a:t>
+            </a:r>
+            <a:endParaRPr lang="x-none" dirty="0"/>
+          </a:p>
+        </p:txBody>
+      </p:sp>
+    </p:spTree>
+    <p:extLst>
+      <p:ext uri="{BB962C8B-B14F-4D97-AF65-F5344CB8AC3E}">
+        <p14:creationId xmlns:p14="http://schemas.microsoft.com/office/powerpoint/2010/main" val="3952441491"/>
+      </p:ext>
+    </p:extLst>
+  </p:cSld>
+  <p:clrMapOvr>
+    <a:masterClrMapping/>
+  </p:clrMapOvr>
+</p:sld>
+</file>
+
+<file path=ppt/slides/slide21.xml><?xml version="1.0" encoding="utf-8"?>
 <p:sld xmlns:a="http://schemas.openxmlformats.org/drawingml/2006/main" xmlns:r="http://schemas.openxmlformats.org/officeDocument/2006/relationships" xmlns:p="http://schemas.openxmlformats.org/presentationml/2006/main">
   <p:cSld>
     <p:spTree>
@@ -5749,7 +5783,7 @@
           <a:p>
             <a:r>
               <a:rPr lang="en-US" dirty="0"/>
-              <a:t>U.S. Dollar</a:t>
+              <a:t>5. U.S. Dollar</a:t>
             </a:r>
           </a:p>
         </p:txBody>
@@ -5792,7 +5826,7 @@
 </p:sld>
 </file>
 
-<file path=ppt/slides/slide21.xml><?xml version="1.0" encoding="utf-8"?>
+<file path=ppt/slides/slide22.xml><?xml version="1.0" encoding="utf-8"?>
 <p:sld xmlns:a="http://schemas.openxmlformats.org/drawingml/2006/main" xmlns:r="http://schemas.openxmlformats.org/officeDocument/2006/relationships" xmlns:p="http://schemas.openxmlformats.org/presentationml/2006/main">
   <p:cSld>
     <p:spTree>
@@ -5882,7 +5916,7 @@
 </p:sld>
 </file>
 
-<file path=ppt/slides/slide22.xml><?xml version="1.0" encoding="utf-8"?>
+<file path=ppt/slides/slide23.xml><?xml version="1.0" encoding="utf-8"?>
 <p:sld xmlns:a="http://schemas.openxmlformats.org/drawingml/2006/main" xmlns:r="http://schemas.openxmlformats.org/officeDocument/2006/relationships" xmlns:p="http://schemas.openxmlformats.org/presentationml/2006/main">
   <p:cSld>
     <p:spTree>
@@ -5972,7 +6006,7 @@
 </p:sld>
 </file>
 
-<file path=ppt/slides/slide23.xml><?xml version="1.0" encoding="utf-8"?>
+<file path=ppt/slides/slide24.xml><?xml version="1.0" encoding="utf-8"?>
 <p:sld xmlns:a="http://schemas.openxmlformats.org/drawingml/2006/main" xmlns:r="http://schemas.openxmlformats.org/officeDocument/2006/relationships" xmlns:p="http://schemas.openxmlformats.org/presentationml/2006/main">
   <p:cSld>
     <p:spTree>
@@ -6137,7 +6171,7 @@
 </p:sld>
 </file>
 
-<file path=ppt/slides/slide24.xml><?xml version="1.0" encoding="utf-8"?>
+<file path=ppt/slides/slide25.xml><?xml version="1.0" encoding="utf-8"?>
 <p:sld xmlns:a="http://schemas.openxmlformats.org/drawingml/2006/main" xmlns:r="http://schemas.openxmlformats.org/officeDocument/2006/relationships" xmlns:p="http://schemas.openxmlformats.org/presentationml/2006/main">
   <p:cSld>
     <p:spTree>
@@ -6261,89 +6295,6 @@
     <p:extLst>
       <p:ext uri="{BB962C8B-B14F-4D97-AF65-F5344CB8AC3E}">
         <p14:creationId xmlns:p14="http://schemas.microsoft.com/office/powerpoint/2010/main" val="3892573509"/>
-      </p:ext>
-    </p:extLst>
-  </p:cSld>
-  <p:clrMapOvr>
-    <a:masterClrMapping/>
-  </p:clrMapOvr>
-</p:sld>
-</file>
-
-<file path=ppt/slides/slide25.xml><?xml version="1.0" encoding="utf-8"?>
-<p:sld xmlns:a="http://schemas.openxmlformats.org/drawingml/2006/main" xmlns:r="http://schemas.openxmlformats.org/officeDocument/2006/relationships" xmlns:p="http://schemas.openxmlformats.org/presentationml/2006/main">
-  <p:cSld>
-    <p:spTree>
-      <p:nvGrpSpPr>
-        <p:cNvPr id="1" name=""/>
-        <p:cNvGrpSpPr/>
-        <p:nvPr/>
-      </p:nvGrpSpPr>
-      <p:grpSpPr>
-        <a:xfrm>
-          <a:off x="0" y="0"/>
-          <a:ext cx="0" cy="0"/>
-          <a:chOff x="0" y="0"/>
-          <a:chExt cx="0" cy="0"/>
-        </a:xfrm>
-      </p:grpSpPr>
-      <p:sp>
-        <p:nvSpPr>
-          <p:cNvPr id="2" name="Title 1">
-            <a:extLst>
-              <a:ext uri="{FF2B5EF4-FFF2-40B4-BE49-F238E27FC236}">
-                <a16:creationId xmlns:a16="http://schemas.microsoft.com/office/drawing/2014/main" id="{F9C550A7-A14D-8F56-6E78-536304B5E29D}"/>
-              </a:ext>
-            </a:extLst>
-          </p:cNvPr>
-          <p:cNvSpPr>
-            <a:spLocks noGrp="1"/>
-          </p:cNvSpPr>
-          <p:nvPr>
-            <p:ph type="title"/>
-          </p:nvPr>
-        </p:nvSpPr>
-        <p:spPr/>
-        <p:txBody>
-          <a:bodyPr/>
-          <a:lstStyle/>
-          <a:p>
-            <a:r>
-              <a:rPr lang="en-US" dirty="0"/>
-              <a:t>Forecast</a:t>
-            </a:r>
-          </a:p>
-        </p:txBody>
-      </p:sp>
-      <p:sp>
-        <p:nvSpPr>
-          <p:cNvPr id="3" name="Text Placeholder 2">
-            <a:extLst>
-              <a:ext uri="{FF2B5EF4-FFF2-40B4-BE49-F238E27FC236}">
-                <a16:creationId xmlns:a16="http://schemas.microsoft.com/office/drawing/2014/main" id="{141B9FD5-312C-3B4A-B9FA-0C8C46F92573}"/>
-              </a:ext>
-            </a:extLst>
-          </p:cNvPr>
-          <p:cNvSpPr>
-            <a:spLocks noGrp="1"/>
-          </p:cNvSpPr>
-          <p:nvPr>
-            <p:ph type="body" idx="1"/>
-          </p:nvPr>
-        </p:nvSpPr>
-        <p:spPr/>
-        <p:txBody>
-          <a:bodyPr/>
-          <a:lstStyle/>
-          <a:p>
-            <a:endParaRPr lang="en-US"/>
-          </a:p>
-        </p:txBody>
-      </p:sp>
-    </p:spTree>
-    <p:extLst>
-      <p:ext uri="{BB962C8B-B14F-4D97-AF65-F5344CB8AC3E}">
-        <p14:creationId xmlns:p14="http://schemas.microsoft.com/office/powerpoint/2010/main" val="2423505088"/>
       </p:ext>
     </p:extLst>
   </p:cSld>
@@ -6372,6 +6323,89 @@
       </p:grpSpPr>
       <p:sp>
         <p:nvSpPr>
+          <p:cNvPr id="2" name="Title 1">
+            <a:extLst>
+              <a:ext uri="{FF2B5EF4-FFF2-40B4-BE49-F238E27FC236}">
+                <a16:creationId xmlns:a16="http://schemas.microsoft.com/office/drawing/2014/main" id="{F9C550A7-A14D-8F56-6E78-536304B5E29D}"/>
+              </a:ext>
+            </a:extLst>
+          </p:cNvPr>
+          <p:cNvSpPr>
+            <a:spLocks noGrp="1"/>
+          </p:cNvSpPr>
+          <p:nvPr>
+            <p:ph type="title"/>
+          </p:nvPr>
+        </p:nvSpPr>
+        <p:spPr/>
+        <p:txBody>
+          <a:bodyPr/>
+          <a:lstStyle/>
+          <a:p>
+            <a:r>
+              <a:rPr lang="en-US" dirty="0"/>
+              <a:t>6. Forecast</a:t>
+            </a:r>
+          </a:p>
+        </p:txBody>
+      </p:sp>
+      <p:sp>
+        <p:nvSpPr>
+          <p:cNvPr id="3" name="Text Placeholder 2">
+            <a:extLst>
+              <a:ext uri="{FF2B5EF4-FFF2-40B4-BE49-F238E27FC236}">
+                <a16:creationId xmlns:a16="http://schemas.microsoft.com/office/drawing/2014/main" id="{141B9FD5-312C-3B4A-B9FA-0C8C46F92573}"/>
+              </a:ext>
+            </a:extLst>
+          </p:cNvPr>
+          <p:cNvSpPr>
+            <a:spLocks noGrp="1"/>
+          </p:cNvSpPr>
+          <p:nvPr>
+            <p:ph type="body" idx="1"/>
+          </p:nvPr>
+        </p:nvSpPr>
+        <p:spPr/>
+        <p:txBody>
+          <a:bodyPr/>
+          <a:lstStyle/>
+          <a:p>
+            <a:endParaRPr lang="en-US"/>
+          </a:p>
+        </p:txBody>
+      </p:sp>
+    </p:spTree>
+    <p:extLst>
+      <p:ext uri="{BB962C8B-B14F-4D97-AF65-F5344CB8AC3E}">
+        <p14:creationId xmlns:p14="http://schemas.microsoft.com/office/powerpoint/2010/main" val="2423505088"/>
+      </p:ext>
+    </p:extLst>
+  </p:cSld>
+  <p:clrMapOvr>
+    <a:masterClrMapping/>
+  </p:clrMapOvr>
+</p:sld>
+</file>
+
+<file path=ppt/slides/slide27.xml><?xml version="1.0" encoding="utf-8"?>
+<p:sld xmlns:a="http://schemas.openxmlformats.org/drawingml/2006/main" xmlns:r="http://schemas.openxmlformats.org/officeDocument/2006/relationships" xmlns:p="http://schemas.openxmlformats.org/presentationml/2006/main">
+  <p:cSld>
+    <p:spTree>
+      <p:nvGrpSpPr>
+        <p:cNvPr id="1" name=""/>
+        <p:cNvGrpSpPr/>
+        <p:nvPr/>
+      </p:nvGrpSpPr>
+      <p:grpSpPr>
+        <a:xfrm>
+          <a:off x="0" y="0"/>
+          <a:ext cx="0" cy="0"/>
+          <a:chOff x="0" y="0"/>
+          <a:chExt cx="0" cy="0"/>
+        </a:xfrm>
+      </p:grpSpPr>
+      <p:sp>
+        <p:nvSpPr>
           <p:cNvPr id="4" name="Title 3">
             <a:extLst>
               <a:ext uri="{FF2B5EF4-FFF2-40B4-BE49-F238E27FC236}">
@@ -6515,7 +6549,7 @@
 </p:sld>
 </file>
 
-<file path=ppt/slides/slide27.xml><?xml version="1.0" encoding="utf-8"?>
+<file path=ppt/slides/slide28.xml><?xml version="1.0" encoding="utf-8"?>
 <p:sld xmlns:a="http://schemas.openxmlformats.org/drawingml/2006/main" xmlns:r="http://schemas.openxmlformats.org/officeDocument/2006/relationships" xmlns:p="http://schemas.openxmlformats.org/presentationml/2006/main">
   <p:cSld>
     <p:spTree>
@@ -6787,7 +6821,7 @@
 </p:sld>
 </file>
 
-<file path=ppt/slides/slide28.xml><?xml version="1.0" encoding="utf-8"?>
+<file path=ppt/slides/slide29.xml><?xml version="1.0" encoding="utf-8"?>
 <p:sld xmlns:a="http://schemas.openxmlformats.org/drawingml/2006/main" xmlns:r="http://schemas.openxmlformats.org/officeDocument/2006/relationships" xmlns:p="http://schemas.openxmlformats.org/presentationml/2006/main">
   <p:cSld>
     <p:spTree>
@@ -6877,7 +6911,147 @@
 </p:sld>
 </file>
 
-<file path=ppt/slides/slide29.xml><?xml version="1.0" encoding="utf-8"?>
+<file path=ppt/slides/slide3.xml><?xml version="1.0" encoding="utf-8"?>
+<p:sld xmlns:a="http://schemas.openxmlformats.org/drawingml/2006/main" xmlns:r="http://schemas.openxmlformats.org/officeDocument/2006/relationships" xmlns:p="http://schemas.openxmlformats.org/presentationml/2006/main">
+  <p:cSld>
+    <p:spTree>
+      <p:nvGrpSpPr>
+        <p:cNvPr id="1" name=""/>
+        <p:cNvGrpSpPr/>
+        <p:nvPr/>
+      </p:nvGrpSpPr>
+      <p:grpSpPr>
+        <a:xfrm>
+          <a:off x="0" y="0"/>
+          <a:ext cx="0" cy="0"/>
+          <a:chOff x="0" y="0"/>
+          <a:chExt cx="0" cy="0"/>
+        </a:xfrm>
+      </p:grpSpPr>
+      <p:sp>
+        <p:nvSpPr>
+          <p:cNvPr id="2" name="Title 1">
+            <a:extLst>
+              <a:ext uri="{FF2B5EF4-FFF2-40B4-BE49-F238E27FC236}">
+                <a16:creationId xmlns:a16="http://schemas.microsoft.com/office/drawing/2014/main" id="{F92F6E53-B2B1-974C-A528-A2F8857ACD21}"/>
+              </a:ext>
+            </a:extLst>
+          </p:cNvPr>
+          <p:cNvSpPr>
+            <a:spLocks noGrp="1"/>
+          </p:cNvSpPr>
+          <p:nvPr>
+            <p:ph type="title"/>
+          </p:nvPr>
+        </p:nvSpPr>
+        <p:spPr/>
+        <p:txBody>
+          <a:bodyPr/>
+          <a:lstStyle/>
+          <a:p>
+            <a:r>
+              <a:rPr lang="en-US"/>
+              <a:t>Forecasting Approaches</a:t>
+            </a:r>
+            <a:endParaRPr lang="en-US" dirty="0"/>
+          </a:p>
+        </p:txBody>
+      </p:sp>
+      <p:sp>
+        <p:nvSpPr>
+          <p:cNvPr id="3" name="Content Placeholder 2">
+            <a:extLst>
+              <a:ext uri="{FF2B5EF4-FFF2-40B4-BE49-F238E27FC236}">
+                <a16:creationId xmlns:a16="http://schemas.microsoft.com/office/drawing/2014/main" id="{1D6CF543-3291-DE2F-9FF9-97DBD4DD59C8}"/>
+              </a:ext>
+            </a:extLst>
+          </p:cNvPr>
+          <p:cNvSpPr>
+            <a:spLocks noGrp="1"/>
+          </p:cNvSpPr>
+          <p:nvPr>
+            <p:ph idx="1"/>
+          </p:nvPr>
+        </p:nvSpPr>
+        <p:spPr/>
+        <p:txBody>
+          <a:bodyPr/>
+          <a:lstStyle/>
+          <a:p>
+            <a:pPr marL="514350" indent="-514350">
+              <a:buFont typeface="+mj-lt"/>
+              <a:buAutoNum type="arabicPeriod"/>
+            </a:pPr>
+            <a:r>
+              <a:rPr lang="en-US" b="1" dirty="0"/>
+              <a:t>Technical Analysis</a:t>
+            </a:r>
+            <a:r>
+              <a:rPr lang="en-US" dirty="0"/>
+              <a:t>: Discretionary price and volume analysis</a:t>
+            </a:r>
+          </a:p>
+          <a:p>
+            <a:pPr marL="514350" indent="-514350">
+              <a:buFont typeface="+mj-lt"/>
+              <a:buAutoNum type="arabicPeriod"/>
+            </a:pPr>
+            <a:r>
+              <a:rPr lang="en-US" b="1" dirty="0"/>
+              <a:t>Quantitative Analysis</a:t>
+            </a:r>
+            <a:r>
+              <a:rPr lang="en-US" dirty="0"/>
+              <a:t>: Applying statistics and machine learning</a:t>
+            </a:r>
+          </a:p>
+          <a:p>
+            <a:pPr marL="514350" indent="-514350">
+              <a:buFont typeface="+mj-lt"/>
+              <a:buAutoNum type="arabicPeriod"/>
+            </a:pPr>
+            <a:r>
+              <a:rPr lang="en-US" b="1" dirty="0"/>
+              <a:t>Sentiment Analysis</a:t>
+            </a:r>
+            <a:r>
+              <a:rPr lang="en-US" dirty="0"/>
+              <a:t>: General sentiment of market participants</a:t>
+            </a:r>
+          </a:p>
+          <a:p>
+            <a:pPr marL="514350" indent="-514350">
+              <a:buFont typeface="+mj-lt"/>
+              <a:buAutoNum type="arabicPeriod"/>
+            </a:pPr>
+            <a:r>
+              <a:rPr lang="en-US" b="1" dirty="0"/>
+              <a:t>Fundamental Analysis</a:t>
+            </a:r>
+            <a:r>
+              <a:rPr lang="en-US" dirty="0"/>
+              <a:t>: Economics and finance theories on value, equilibrium levels, and supply and demand</a:t>
+            </a:r>
+          </a:p>
+          <a:p>
+            <a:endParaRPr lang="en-US" dirty="0"/>
+          </a:p>
+        </p:txBody>
+      </p:sp>
+    </p:spTree>
+    <p:extLst>
+      <p:ext uri="{BB962C8B-B14F-4D97-AF65-F5344CB8AC3E}">
+        <p14:creationId xmlns:p14="http://schemas.microsoft.com/office/powerpoint/2010/main" val="2647621218"/>
+      </p:ext>
+    </p:extLst>
+  </p:cSld>
+  <p:clrMapOvr>
+    <a:masterClrMapping/>
+  </p:clrMapOvr>
+</p:sld>
+</file>
+
+<file path=ppt/slides/slide30.xml><?xml version="1.0" encoding="utf-8"?>
 <p:sld xmlns:a="http://schemas.openxmlformats.org/drawingml/2006/main" xmlns:r="http://schemas.openxmlformats.org/officeDocument/2006/relationships" xmlns:p="http://schemas.openxmlformats.org/presentationml/2006/main">
   <p:cSld>
     <p:spTree>
@@ -7149,7 +7323,7 @@
 </p:sld>
 </file>
 
-<file path=ppt/slides/slide3.xml><?xml version="1.0" encoding="utf-8"?>
+<file path=ppt/slides/slide31.xml><?xml version="1.0" encoding="utf-8"?>
 <p:sld xmlns:a="http://schemas.openxmlformats.org/drawingml/2006/main" xmlns:r="http://schemas.openxmlformats.org/officeDocument/2006/relationships" xmlns:p="http://schemas.openxmlformats.org/presentationml/2006/main">
   <p:cSld>
     <p:spTree>
@@ -7168,90 +7342,6 @@
       </p:grpSpPr>
       <p:sp>
         <p:nvSpPr>
-          <p:cNvPr id="4" name="Title 3">
-            <a:extLst>
-              <a:ext uri="{FF2B5EF4-FFF2-40B4-BE49-F238E27FC236}">
-                <a16:creationId xmlns:a16="http://schemas.microsoft.com/office/drawing/2014/main" id="{3C9174E9-4CDF-052B-06AA-5618A1B221FE}"/>
-              </a:ext>
-            </a:extLst>
-          </p:cNvPr>
-          <p:cNvSpPr>
-            <a:spLocks noGrp="1"/>
-          </p:cNvSpPr>
-          <p:nvPr>
-            <p:ph type="title"/>
-          </p:nvPr>
-        </p:nvSpPr>
-        <p:spPr/>
-        <p:txBody>
-          <a:bodyPr/>
-          <a:lstStyle/>
-          <a:p>
-            <a:r>
-              <a:rPr lang="en-US"/>
-              <a:t>Key Drivers of the CAD/USD Exchange Rate</a:t>
-            </a:r>
-            <a:endParaRPr lang="en-US" dirty="0"/>
-          </a:p>
-        </p:txBody>
-      </p:sp>
-      <p:sp>
-        <p:nvSpPr>
-          <p:cNvPr id="5" name="Text Placeholder 4">
-            <a:extLst>
-              <a:ext uri="{FF2B5EF4-FFF2-40B4-BE49-F238E27FC236}">
-                <a16:creationId xmlns:a16="http://schemas.microsoft.com/office/drawing/2014/main" id="{9D397D09-EF1C-035D-B6EB-408290330A93}"/>
-              </a:ext>
-            </a:extLst>
-          </p:cNvPr>
-          <p:cNvSpPr>
-            <a:spLocks noGrp="1"/>
-          </p:cNvSpPr>
-          <p:nvPr>
-            <p:ph type="body" idx="1"/>
-          </p:nvPr>
-        </p:nvSpPr>
-        <p:spPr/>
-        <p:txBody>
-          <a:bodyPr/>
-          <a:lstStyle/>
-          <a:p>
-            <a:endParaRPr lang="en-US"/>
-          </a:p>
-        </p:txBody>
-      </p:sp>
-    </p:spTree>
-    <p:extLst>
-      <p:ext uri="{BB962C8B-B14F-4D97-AF65-F5344CB8AC3E}">
-        <p14:creationId xmlns:p14="http://schemas.microsoft.com/office/powerpoint/2010/main" val="591847203"/>
-      </p:ext>
-    </p:extLst>
-  </p:cSld>
-  <p:clrMapOvr>
-    <a:masterClrMapping/>
-  </p:clrMapOvr>
-</p:sld>
-</file>
-
-<file path=ppt/slides/slide30.xml><?xml version="1.0" encoding="utf-8"?>
-<p:sld xmlns:a="http://schemas.openxmlformats.org/drawingml/2006/main" xmlns:r="http://schemas.openxmlformats.org/officeDocument/2006/relationships" xmlns:p="http://schemas.openxmlformats.org/presentationml/2006/main">
-  <p:cSld>
-    <p:spTree>
-      <p:nvGrpSpPr>
-        <p:cNvPr id="1" name=""/>
-        <p:cNvGrpSpPr/>
-        <p:nvPr/>
-      </p:nvGrpSpPr>
-      <p:grpSpPr>
-        <a:xfrm>
-          <a:off x="0" y="0"/>
-          <a:ext cx="0" cy="0"/>
-          <a:chOff x="0" y="0"/>
-          <a:chExt cx="0" cy="0"/>
-        </a:xfrm>
-      </p:grpSpPr>
-      <p:sp>
-        <p:nvSpPr>
           <p:cNvPr id="2" name="Title 1">
             <a:extLst>
               <a:ext uri="{FF2B5EF4-FFF2-40B4-BE49-F238E27FC236}">
@@ -7273,7 +7363,7 @@
           <a:p>
             <a:r>
               <a:rPr lang="en-US" dirty="0"/>
-              <a:t>Conclusion</a:t>
+              <a:t>7. Conclusion</a:t>
             </a:r>
           </a:p>
         </p:txBody>
@@ -7301,7 +7391,7 @@
           <a:p>
             <a:r>
               <a:rPr lang="en-US" dirty="0"/>
-              <a:t>CAD/USD Bearish Outlook for 2026</a:t>
+              <a:t>CAD/USD: Bearish Outlook for 2026</a:t>
             </a:r>
           </a:p>
         </p:txBody>
@@ -7319,7 +7409,7 @@
 </p:sld>
 </file>
 
-<file path=ppt/slides/slide31.xml><?xml version="1.0" encoding="utf-8"?>
+<file path=ppt/slides/slide32.xml><?xml version="1.0" encoding="utf-8"?>
 <p:sld xmlns:a="http://schemas.openxmlformats.org/drawingml/2006/main" xmlns:r="http://schemas.openxmlformats.org/officeDocument/2006/relationships" xmlns:p="http://schemas.openxmlformats.org/presentationml/2006/main">
   <p:cSld>
     <p:spTree>
@@ -7448,6 +7538,89 @@
       </p:grpSpPr>
       <p:sp>
         <p:nvSpPr>
+          <p:cNvPr id="4" name="Title 3">
+            <a:extLst>
+              <a:ext uri="{FF2B5EF4-FFF2-40B4-BE49-F238E27FC236}">
+                <a16:creationId xmlns:a16="http://schemas.microsoft.com/office/drawing/2014/main" id="{3C9174E9-4CDF-052B-06AA-5618A1B221FE}"/>
+              </a:ext>
+            </a:extLst>
+          </p:cNvPr>
+          <p:cNvSpPr>
+            <a:spLocks noGrp="1"/>
+          </p:cNvSpPr>
+          <p:nvPr>
+            <p:ph type="title"/>
+          </p:nvPr>
+        </p:nvSpPr>
+        <p:spPr/>
+        <p:txBody>
+          <a:bodyPr/>
+          <a:lstStyle/>
+          <a:p>
+            <a:r>
+              <a:rPr lang="en-US" dirty="0"/>
+              <a:t>2. Key Drivers of the CAD/USD Exchange Rate</a:t>
+            </a:r>
+          </a:p>
+        </p:txBody>
+      </p:sp>
+      <p:sp>
+        <p:nvSpPr>
+          <p:cNvPr id="5" name="Text Placeholder 4">
+            <a:extLst>
+              <a:ext uri="{FF2B5EF4-FFF2-40B4-BE49-F238E27FC236}">
+                <a16:creationId xmlns:a16="http://schemas.microsoft.com/office/drawing/2014/main" id="{9D397D09-EF1C-035D-B6EB-408290330A93}"/>
+              </a:ext>
+            </a:extLst>
+          </p:cNvPr>
+          <p:cNvSpPr>
+            <a:spLocks noGrp="1"/>
+          </p:cNvSpPr>
+          <p:nvPr>
+            <p:ph type="body" idx="1"/>
+          </p:nvPr>
+        </p:nvSpPr>
+        <p:spPr/>
+        <p:txBody>
+          <a:bodyPr/>
+          <a:lstStyle/>
+          <a:p>
+            <a:endParaRPr lang="en-US"/>
+          </a:p>
+        </p:txBody>
+      </p:sp>
+    </p:spTree>
+    <p:extLst>
+      <p:ext uri="{BB962C8B-B14F-4D97-AF65-F5344CB8AC3E}">
+        <p14:creationId xmlns:p14="http://schemas.microsoft.com/office/powerpoint/2010/main" val="591847203"/>
+      </p:ext>
+    </p:extLst>
+  </p:cSld>
+  <p:clrMapOvr>
+    <a:masterClrMapping/>
+  </p:clrMapOvr>
+</p:sld>
+</file>
+
+<file path=ppt/slides/slide5.xml><?xml version="1.0" encoding="utf-8"?>
+<p:sld xmlns:a="http://schemas.openxmlformats.org/drawingml/2006/main" xmlns:r="http://schemas.openxmlformats.org/officeDocument/2006/relationships" xmlns:p="http://schemas.openxmlformats.org/presentationml/2006/main">
+  <p:cSld>
+    <p:spTree>
+      <p:nvGrpSpPr>
+        <p:cNvPr id="1" name=""/>
+        <p:cNvGrpSpPr/>
+        <p:nvPr/>
+      </p:nvGrpSpPr>
+      <p:grpSpPr>
+        <a:xfrm>
+          <a:off x="0" y="0"/>
+          <a:ext cx="0" cy="0"/>
+          <a:chOff x="0" y="0"/>
+          <a:chExt cx="0" cy="0"/>
+        </a:xfrm>
+      </p:grpSpPr>
+      <p:sp>
+        <p:nvSpPr>
           <p:cNvPr id="2" name="Title 1">
             <a:extLst>
               <a:ext uri="{FF2B5EF4-FFF2-40B4-BE49-F238E27FC236}">
@@ -7520,7 +7693,7 @@
 </p:sld>
 </file>
 
-<file path=ppt/slides/slide5.xml><?xml version="1.0" encoding="utf-8"?>
+<file path=ppt/slides/slide6.xml><?xml version="1.0" encoding="utf-8"?>
 <p:sld xmlns:a="http://schemas.openxmlformats.org/drawingml/2006/main" xmlns:r="http://schemas.openxmlformats.org/officeDocument/2006/relationships" xmlns:p="http://schemas.openxmlformats.org/presentationml/2006/main">
   <p:cSld>
     <p:spTree>
@@ -7655,7 +7828,7 @@
 </p:sld>
 </file>
 
-<file path=ppt/slides/slide6.xml><?xml version="1.0" encoding="utf-8"?>
+<file path=ppt/slides/slide7.xml><?xml version="1.0" encoding="utf-8"?>
 <p:sld xmlns:a="http://schemas.openxmlformats.org/drawingml/2006/main" xmlns:r="http://schemas.openxmlformats.org/officeDocument/2006/relationships" xmlns:p="http://schemas.openxmlformats.org/presentationml/2006/main">
   <p:cSld>
     <p:spTree>
@@ -7746,7 +7919,7 @@
 </p:sld>
 </file>
 
-<file path=ppt/slides/slide7.xml><?xml version="1.0" encoding="utf-8"?>
+<file path=ppt/slides/slide8.xml><?xml version="1.0" encoding="utf-8"?>
 <p:sld xmlns:a="http://schemas.openxmlformats.org/drawingml/2006/main" xmlns:r="http://schemas.openxmlformats.org/officeDocument/2006/relationships" xmlns:p="http://schemas.openxmlformats.org/presentationml/2006/main">
   <p:cSld>
     <p:spTree>
@@ -7836,7 +8009,7 @@
 </p:sld>
 </file>
 
-<file path=ppt/slides/slide8.xml><?xml version="1.0" encoding="utf-8"?>
+<file path=ppt/slides/slide9.xml><?xml version="1.0" encoding="utf-8"?>
 <p:sld xmlns:a="http://schemas.openxmlformats.org/drawingml/2006/main" xmlns:r="http://schemas.openxmlformats.org/officeDocument/2006/relationships" xmlns:p="http://schemas.openxmlformats.org/presentationml/2006/main">
   <p:cSld>
     <p:spTree>
@@ -7917,96 +8090,6 @@
     <p:extLst>
       <p:ext uri="{BB962C8B-B14F-4D97-AF65-F5344CB8AC3E}">
         <p14:creationId xmlns:p14="http://schemas.microsoft.com/office/powerpoint/2010/main" val="597341993"/>
-      </p:ext>
-    </p:extLst>
-  </p:cSld>
-  <p:clrMapOvr>
-    <a:masterClrMapping/>
-  </p:clrMapOvr>
-</p:sld>
-</file>
-
-<file path=ppt/slides/slide9.xml><?xml version="1.0" encoding="utf-8"?>
-<p:sld xmlns:a="http://schemas.openxmlformats.org/drawingml/2006/main" xmlns:r="http://schemas.openxmlformats.org/officeDocument/2006/relationships" xmlns:p="http://schemas.openxmlformats.org/presentationml/2006/main">
-  <p:cSld>
-    <p:spTree>
-      <p:nvGrpSpPr>
-        <p:cNvPr id="1" name=""/>
-        <p:cNvGrpSpPr/>
-        <p:nvPr/>
-      </p:nvGrpSpPr>
-      <p:grpSpPr>
-        <a:xfrm>
-          <a:off x="0" y="0"/>
-          <a:ext cx="0" cy="0"/>
-          <a:chOff x="0" y="0"/>
-          <a:chExt cx="0" cy="0"/>
-        </a:xfrm>
-      </p:grpSpPr>
-      <p:sp>
-        <p:nvSpPr>
-          <p:cNvPr id="2" name="Title 1">
-            <a:extLst>
-              <a:ext uri="{FF2B5EF4-FFF2-40B4-BE49-F238E27FC236}">
-                <a16:creationId xmlns:a16="http://schemas.microsoft.com/office/drawing/2014/main" id="{BB9F5CB4-761A-0CFA-6810-F801DAB87CFE}"/>
-              </a:ext>
-            </a:extLst>
-          </p:cNvPr>
-          <p:cNvSpPr>
-            <a:spLocks noGrp="1"/>
-          </p:cNvSpPr>
-          <p:nvPr>
-            <p:ph type="title"/>
-          </p:nvPr>
-        </p:nvSpPr>
-        <p:spPr/>
-        <p:txBody>
-          <a:bodyPr/>
-          <a:lstStyle/>
-          <a:p>
-            <a:r>
-              <a:rPr lang="en-US" dirty="0"/>
-              <a:t>Dollar Index (DXY)</a:t>
-            </a:r>
-          </a:p>
-        </p:txBody>
-      </p:sp>
-      <p:pic>
-        <p:nvPicPr>
-          <p:cNvPr id="5" name="Content Placeholder 4">
-            <a:extLst>
-              <a:ext uri="{FF2B5EF4-FFF2-40B4-BE49-F238E27FC236}">
-                <a16:creationId xmlns:a16="http://schemas.microsoft.com/office/drawing/2014/main" id="{269C7277-0160-3C52-0BF7-3D48BF5288E0}"/>
-              </a:ext>
-            </a:extLst>
-          </p:cNvPr>
-          <p:cNvPicPr>
-            <a:picLocks noGrp="1" noChangeAspect="1"/>
-          </p:cNvPicPr>
-          <p:nvPr>
-            <p:ph idx="1"/>
-          </p:nvPr>
-        </p:nvPicPr>
-        <p:blipFill>
-          <a:blip r:embed="rId2"/>
-          <a:stretch>
-            <a:fillRect/>
-          </a:stretch>
-        </p:blipFill>
-        <p:spPr>
-          <a:xfrm>
-            <a:off x="2493406" y="1825625"/>
-            <a:ext cx="7205188" cy="4351338"/>
-          </a:xfrm>
-          <a:prstGeom prst="rect">
-            <a:avLst/>
-          </a:prstGeom>
-        </p:spPr>
-      </p:pic>
-    </p:spTree>
-    <p:extLst>
-      <p:ext uri="{BB962C8B-B14F-4D97-AF65-F5344CB8AC3E}">
-        <p14:creationId xmlns:p14="http://schemas.microsoft.com/office/powerpoint/2010/main" val="403296574"/>
       </p:ext>
     </p:extLst>
   </p:cSld>

</xml_diff>